<commit_message>
final Release Plan Presentation
</commit_message>
<xml_diff>
--- a/Documentation/Release Plan Presentation.pptx
+++ b/Documentation/Release Plan Presentation.pptx
@@ -19058,7 +19058,7 @@
             </a:endParaRPr>
           </a:p>
           <a:p>
-            <a:pPr indent="-252411" lvl="0" marL="341312" marR="0" rtl="0" algn="l">
+            <a:pPr indent="-252412" lvl="0" marL="341312" marR="0" rtl="0" algn="l">
               <a:lnSpc>
                 <a:spcPct val="100000"/>
               </a:lnSpc>
@@ -19087,7 +19087,115 @@
               </a:rPr>
               <a:t>High level goal(s):</a:t>
             </a:r>
-            <a:endParaRPr b="1" i="0" sz="1800" u="none" cap="none" strike="noStrike">
+            <a:endParaRPr b="1" sz="1800">
+              <a:latin typeface="Times New Roman"/>
+              <a:ea typeface="Times New Roman"/>
+              <a:cs typeface="Times New Roman"/>
+              <a:sym typeface="Times New Roman"/>
+            </a:endParaRPr>
+          </a:p>
+          <a:p>
+            <a:pPr indent="-182562" lvl="1" marL="741362" rtl="0">
+              <a:lnSpc>
+                <a:spcPct val="115000"/>
+              </a:lnSpc>
+              <a:spcBef>
+                <a:spcPts val="0"/>
+              </a:spcBef>
+              <a:spcAft>
+                <a:spcPts val="0"/>
+              </a:spcAft>
+              <a:buClr>
+                <a:schemeClr val="dk1"/>
+              </a:buClr>
+              <a:buSzPts val="1200"/>
+              <a:buFont typeface="Times New Roman"/>
+              <a:buChar char="–"/>
+            </a:pPr>
+            <a:r>
+              <a:rPr lang="en-US" sz="1200">
+                <a:latin typeface="Times New Roman"/>
+                <a:ea typeface="Times New Roman"/>
+                <a:cs typeface="Times New Roman"/>
+                <a:sym typeface="Times New Roman"/>
+              </a:rPr>
+              <a:t>Be able to display paths that were created over time by UC Santa Cruz people</a:t>
+            </a:r>
+            <a:endParaRPr sz="1200">
+              <a:latin typeface="Times New Roman"/>
+              <a:ea typeface="Times New Roman"/>
+              <a:cs typeface="Times New Roman"/>
+              <a:sym typeface="Times New Roman"/>
+            </a:endParaRPr>
+          </a:p>
+          <a:p>
+            <a:pPr indent="-182562" lvl="1" marL="741362" marR="0" rtl="0" algn="l">
+              <a:lnSpc>
+                <a:spcPct val="115000"/>
+              </a:lnSpc>
+              <a:spcBef>
+                <a:spcPts val="0"/>
+              </a:spcBef>
+              <a:spcAft>
+                <a:spcPts val="0"/>
+              </a:spcAft>
+              <a:buClr>
+                <a:schemeClr val="dk1"/>
+              </a:buClr>
+              <a:buSzPts val="1200"/>
+              <a:buFont typeface="Times New Roman"/>
+              <a:buChar char="–"/>
+            </a:pPr>
+            <a:r>
+              <a:rPr b="0" i="0" lang="en-US" sz="1200" u="none" cap="none" strike="noStrike">
+                <a:solidFill>
+                  <a:schemeClr val="dk1"/>
+                </a:solidFill>
+                <a:latin typeface="Times New Roman"/>
+                <a:ea typeface="Times New Roman"/>
+                <a:cs typeface="Times New Roman"/>
+                <a:sym typeface="Times New Roman"/>
+              </a:rPr>
+              <a:t>Be able to represent graph data as a readable file</a:t>
+            </a:r>
+            <a:endParaRPr sz="1200">
+              <a:latin typeface="Times New Roman"/>
+              <a:ea typeface="Times New Roman"/>
+              <a:cs typeface="Times New Roman"/>
+              <a:sym typeface="Times New Roman"/>
+            </a:endParaRPr>
+          </a:p>
+          <a:p>
+            <a:pPr indent="-182562" lvl="1" marL="741362" marR="0" rtl="0" algn="l">
+              <a:lnSpc>
+                <a:spcPct val="115000"/>
+              </a:lnSpc>
+              <a:spcBef>
+                <a:spcPts val="0"/>
+              </a:spcBef>
+              <a:spcAft>
+                <a:spcPts val="0"/>
+              </a:spcAft>
+              <a:buClr>
+                <a:schemeClr val="dk1"/>
+              </a:buClr>
+              <a:buSzPts val="1200"/>
+              <a:buFont typeface="Times New Roman"/>
+              <a:buChar char="–"/>
+            </a:pPr>
+            <a:r>
+              <a:rPr b="0" i="0" lang="en-US" sz="1200" u="none" cap="none" strike="noStrike">
+                <a:solidFill>
+                  <a:schemeClr val="dk1"/>
+                </a:solidFill>
+                <a:latin typeface="Times New Roman"/>
+                <a:ea typeface="Times New Roman"/>
+                <a:cs typeface="Times New Roman"/>
+                <a:sym typeface="Times New Roman"/>
+              </a:rPr>
+              <a:t>Be able to organize key locations at UC Santa Cruz</a:t>
+            </a:r>
+            <a:endParaRPr b="0" i="0" sz="1200" u="none" cap="none" strike="noStrike">
               <a:solidFill>
                 <a:schemeClr val="dk1"/>
               </a:solidFill>
@@ -19125,7 +19233,7 @@
                 <a:cs typeface="Times New Roman"/>
                 <a:sym typeface="Times New Roman"/>
               </a:rPr>
-              <a:t>Be able to represent graph data as a readable file</a:t>
+              <a:t>Be able to collect distances and time between two locations</a:t>
             </a:r>
             <a:endParaRPr b="0" i="0" sz="1200" u="none" cap="none" strike="noStrike">
               <a:solidFill>
@@ -19165,7 +19273,7 @@
                 <a:cs typeface="Times New Roman"/>
                 <a:sym typeface="Times New Roman"/>
               </a:rPr>
-              <a:t>Be able to organize key locations at UC Santa Cruz</a:t>
+              <a:t>Be able to have a visual representation if user is going the right direction</a:t>
             </a:r>
             <a:endParaRPr b="0" i="0" sz="1200" u="none" cap="none" strike="noStrike">
               <a:solidFill>
@@ -19205,7 +19313,7 @@
                 <a:cs typeface="Times New Roman"/>
                 <a:sym typeface="Times New Roman"/>
               </a:rPr>
-              <a:t>Be able to collect distances and time between two locations</a:t>
+              <a:t>Be able to find all nearby attractions at one location</a:t>
             </a:r>
             <a:endParaRPr b="0" i="0" sz="1200" u="none" cap="none" strike="noStrike">
               <a:solidFill>
@@ -19236,61 +19344,15 @@
               <a:buChar char="–"/>
             </a:pPr>
             <a:r>
-              <a:rPr b="0" i="0" lang="en-US" sz="1200" u="none" cap="none" strike="noStrike">
-                <a:solidFill>
-                  <a:schemeClr val="dk1"/>
-                </a:solidFill>
+              <a:rPr lang="en-US" sz="1200">
                 <a:latin typeface="Times New Roman"/>
                 <a:ea typeface="Times New Roman"/>
                 <a:cs typeface="Times New Roman"/>
                 <a:sym typeface="Times New Roman"/>
               </a:rPr>
-              <a:t>Be able to have a visual representation if user is going the right direction</a:t>
+              <a:t>Be able to display building maps for every building on campus</a:t>
             </a:r>
-            <a:endParaRPr b="0" i="0" sz="1200" u="none" cap="none" strike="noStrike">
-              <a:solidFill>
-                <a:schemeClr val="dk1"/>
-              </a:solidFill>
-              <a:latin typeface="Times New Roman"/>
-              <a:ea typeface="Times New Roman"/>
-              <a:cs typeface="Times New Roman"/>
-              <a:sym typeface="Times New Roman"/>
-            </a:endParaRPr>
-          </a:p>
-          <a:p>
-            <a:pPr indent="-182562" lvl="1" marL="741362" marR="0" rtl="0" algn="l">
-              <a:lnSpc>
-                <a:spcPct val="115000"/>
-              </a:lnSpc>
-              <a:spcBef>
-                <a:spcPts val="0"/>
-              </a:spcBef>
-              <a:spcAft>
-                <a:spcPts val="0"/>
-              </a:spcAft>
-              <a:buClr>
-                <a:schemeClr val="dk1"/>
-              </a:buClr>
-              <a:buSzPts val="1200"/>
-              <a:buFont typeface="Times New Roman"/>
-              <a:buChar char="–"/>
-            </a:pPr>
-            <a:r>
-              <a:rPr b="0" i="0" lang="en-US" sz="1200" u="none" cap="none" strike="noStrike">
-                <a:solidFill>
-                  <a:schemeClr val="dk1"/>
-                </a:solidFill>
-                <a:latin typeface="Times New Roman"/>
-                <a:ea typeface="Times New Roman"/>
-                <a:cs typeface="Times New Roman"/>
-                <a:sym typeface="Times New Roman"/>
-              </a:rPr>
-              <a:t>Be able to find all nearby attractions at one location</a:t>
-            </a:r>
-            <a:endParaRPr b="0" i="0" sz="1200" u="none" cap="none" strike="noStrike">
-              <a:solidFill>
-                <a:schemeClr val="dk1"/>
-              </a:solidFill>
+            <a:endParaRPr sz="1200">
               <a:latin typeface="Times New Roman"/>
               <a:ea typeface="Times New Roman"/>
               <a:cs typeface="Times New Roman"/>
@@ -22439,6 +22501,285 @@
 </file>
 
 <file path=ppt/theme/theme1.xml><?xml version="1.0" encoding="utf-8"?>
+<a:theme xmlns:a="http://schemas.openxmlformats.org/drawingml/2006/main" xmlns:r="http://schemas.openxmlformats.org/officeDocument/2006/relationships" name="Office Theme">
+  <a:themeElements>
+    <a:clrScheme name="Office">
+      <a:dk1>
+        <a:srgbClr val="000000"/>
+      </a:dk1>
+      <a:lt1>
+        <a:srgbClr val="FFFFFF"/>
+      </a:lt1>
+      <a:dk2>
+        <a:srgbClr val="1F497D"/>
+      </a:dk2>
+      <a:lt2>
+        <a:srgbClr val="EEECE1"/>
+      </a:lt2>
+      <a:accent1>
+        <a:srgbClr val="4F81BD"/>
+      </a:accent1>
+      <a:accent2>
+        <a:srgbClr val="C0504D"/>
+      </a:accent2>
+      <a:accent3>
+        <a:srgbClr val="9BBB59"/>
+      </a:accent3>
+      <a:accent4>
+        <a:srgbClr val="8064A2"/>
+      </a:accent4>
+      <a:accent5>
+        <a:srgbClr val="4BACC6"/>
+      </a:accent5>
+      <a:accent6>
+        <a:srgbClr val="F79646"/>
+      </a:accent6>
+      <a:hlink>
+        <a:srgbClr val="0000FF"/>
+      </a:hlink>
+      <a:folHlink>
+        <a:srgbClr val="800080"/>
+      </a:folHlink>
+    </a:clrScheme>
+    <a:fontScheme name="Office">
+      <a:majorFont>
+        <a:latin typeface="Arial"/>
+        <a:ea typeface=""/>
+        <a:cs typeface=""/>
+        <a:font script="Jpan" typeface="ＭＳ Ｐゴシック"/>
+        <a:font script="Hang" typeface="맑은 고딕"/>
+        <a:font script="Hans" typeface="宋体"/>
+        <a:font script="Hant" typeface="新細明體"/>
+        <a:font script="Arab" typeface="Times New Roman"/>
+        <a:font script="Hebr" typeface="Times New Roman"/>
+        <a:font script="Thai" typeface="Angsana New"/>
+        <a:font script="Ethi" typeface="Nyala"/>
+        <a:font script="Beng" typeface="Vrinda"/>
+        <a:font script="Gujr" typeface="Shruti"/>
+        <a:font script="Khmr" typeface="MoolBoran"/>
+        <a:font script="Knda" typeface="Tunga"/>
+        <a:font script="Guru" typeface="Raavi"/>
+        <a:font script="Cans" typeface="Euphemia"/>
+        <a:font script="Cher" typeface="Plantagenet Cherokee"/>
+        <a:font script="Yiii" typeface="Microsoft Yi Baiti"/>
+        <a:font script="Tibt" typeface="Microsoft Himalaya"/>
+        <a:font script="Thaa" typeface="MV Boli"/>
+        <a:font script="Deva" typeface="Mangal"/>
+        <a:font script="Telu" typeface="Gautami"/>
+        <a:font script="Taml" typeface="Latha"/>
+        <a:font script="Syrc" typeface="Estrangelo Edessa"/>
+        <a:font script="Orya" typeface="Kalinga"/>
+        <a:font script="Mlym" typeface="Kartika"/>
+        <a:font script="Laoo" typeface="DokChampa"/>
+        <a:font script="Sinh" typeface="Iskoola Pota"/>
+        <a:font script="Mong" typeface="Mongolian Baiti"/>
+        <a:font script="Viet" typeface="Times New Roman"/>
+        <a:font script="Uigh" typeface="Microsoft Uighur"/>
+        <a:font script="Geor" typeface="Sylfaen"/>
+      </a:majorFont>
+      <a:minorFont>
+        <a:latin typeface="Arial"/>
+        <a:ea typeface=""/>
+        <a:cs typeface=""/>
+        <a:font script="Jpan" typeface="ＭＳ Ｐゴシック"/>
+        <a:font script="Hang" typeface="맑은 고딕"/>
+        <a:font script="Hans" typeface="宋体"/>
+        <a:font script="Hant" typeface="新細明體"/>
+        <a:font script="Arab" typeface="Arial"/>
+        <a:font script="Hebr" typeface="Arial"/>
+        <a:font script="Thai" typeface="Cordia New"/>
+        <a:font script="Ethi" typeface="Nyala"/>
+        <a:font script="Beng" typeface="Vrinda"/>
+        <a:font script="Gujr" typeface="Shruti"/>
+        <a:font script="Khmr" typeface="DaunPenh"/>
+        <a:font script="Knda" typeface="Tunga"/>
+        <a:font script="Guru" typeface="Raavi"/>
+        <a:font script="Cans" typeface="Euphemia"/>
+        <a:font script="Cher" typeface="Plantagenet Cherokee"/>
+        <a:font script="Yiii" typeface="Microsoft Yi Baiti"/>
+        <a:font script="Tibt" typeface="Microsoft Himalaya"/>
+        <a:font script="Thaa" typeface="MV Boli"/>
+        <a:font script="Deva" typeface="Mangal"/>
+        <a:font script="Telu" typeface="Gautami"/>
+        <a:font script="Taml" typeface="Latha"/>
+        <a:font script="Syrc" typeface="Estrangelo Edessa"/>
+        <a:font script="Orya" typeface="Kalinga"/>
+        <a:font script="Mlym" typeface="Kartika"/>
+        <a:font script="Laoo" typeface="DokChampa"/>
+        <a:font script="Sinh" typeface="Iskoola Pota"/>
+        <a:font script="Mong" typeface="Mongolian Baiti"/>
+        <a:font script="Viet" typeface="Arial"/>
+        <a:font script="Uigh" typeface="Microsoft Uighur"/>
+        <a:font script="Geor" typeface="Sylfaen"/>
+      </a:minorFont>
+    </a:fontScheme>
+    <a:fmtScheme name="Office">
+      <a:fillStyleLst>
+        <a:solidFill>
+          <a:schemeClr val="phClr"/>
+        </a:solidFill>
+        <a:gradFill rotWithShape="1">
+          <a:gsLst>
+            <a:gs pos="0">
+              <a:schemeClr val="phClr">
+                <a:tint val="50000"/>
+                <a:satMod val="300000"/>
+              </a:schemeClr>
+            </a:gs>
+            <a:gs pos="35000">
+              <a:schemeClr val="phClr">
+                <a:tint val="37000"/>
+                <a:satMod val="300000"/>
+              </a:schemeClr>
+            </a:gs>
+            <a:gs pos="100000">
+              <a:schemeClr val="phClr">
+                <a:tint val="15000"/>
+                <a:satMod val="350000"/>
+              </a:schemeClr>
+            </a:gs>
+          </a:gsLst>
+          <a:lin ang="16200000" scaled="1"/>
+        </a:gradFill>
+        <a:gradFill rotWithShape="1">
+          <a:gsLst>
+            <a:gs pos="0">
+              <a:schemeClr val="phClr">
+                <a:tint val="100000"/>
+                <a:shade val="100000"/>
+                <a:satMod val="130000"/>
+              </a:schemeClr>
+            </a:gs>
+            <a:gs pos="100000">
+              <a:schemeClr val="phClr">
+                <a:tint val="50000"/>
+                <a:shade val="100000"/>
+                <a:satMod val="350000"/>
+              </a:schemeClr>
+            </a:gs>
+          </a:gsLst>
+          <a:lin ang="16200000" scaled="0"/>
+        </a:gradFill>
+      </a:fillStyleLst>
+      <a:lnStyleLst>
+        <a:ln w="9525" cap="flat" cmpd="sng" algn="ctr">
+          <a:solidFill>
+            <a:schemeClr val="phClr">
+              <a:shade val="95000"/>
+              <a:satMod val="105000"/>
+            </a:schemeClr>
+          </a:solidFill>
+          <a:prstDash val="solid"/>
+        </a:ln>
+        <a:ln w="25400" cap="flat" cmpd="sng" algn="ctr">
+          <a:solidFill>
+            <a:schemeClr val="phClr"/>
+          </a:solidFill>
+          <a:prstDash val="solid"/>
+        </a:ln>
+        <a:ln w="38100" cap="flat" cmpd="sng" algn="ctr">
+          <a:solidFill>
+            <a:schemeClr val="phClr"/>
+          </a:solidFill>
+          <a:prstDash val="solid"/>
+        </a:ln>
+      </a:lnStyleLst>
+      <a:effectStyleLst>
+        <a:effectStyle>
+          <a:effectLst>
+            <a:outerShdw blurRad="40000" dist="20000" dir="5400000" rotWithShape="0">
+              <a:srgbClr val="000000">
+                <a:alpha val="38000"/>
+              </a:srgbClr>
+            </a:outerShdw>
+          </a:effectLst>
+        </a:effectStyle>
+        <a:effectStyle>
+          <a:effectLst>
+            <a:outerShdw blurRad="40000" dist="23000" dir="5400000" rotWithShape="0">
+              <a:srgbClr val="000000">
+                <a:alpha val="35000"/>
+              </a:srgbClr>
+            </a:outerShdw>
+          </a:effectLst>
+        </a:effectStyle>
+        <a:effectStyle>
+          <a:effectLst>
+            <a:outerShdw blurRad="40000" dist="23000" dir="5400000" rotWithShape="0">
+              <a:srgbClr val="000000">
+                <a:alpha val="35000"/>
+              </a:srgbClr>
+            </a:outerShdw>
+          </a:effectLst>
+          <a:scene3d>
+            <a:camera prst="orthographicFront">
+              <a:rot lat="0" lon="0" rev="0"/>
+            </a:camera>
+            <a:lightRig rig="threePt" dir="t">
+              <a:rot lat="0" lon="0" rev="1200000"/>
+            </a:lightRig>
+          </a:scene3d>
+          <a:sp3d>
+            <a:bevelT w="63500" h="25400"/>
+          </a:sp3d>
+        </a:effectStyle>
+      </a:effectStyleLst>
+      <a:bgFillStyleLst>
+        <a:solidFill>
+          <a:schemeClr val="phClr"/>
+        </a:solidFill>
+        <a:gradFill rotWithShape="1">
+          <a:gsLst>
+            <a:gs pos="0">
+              <a:schemeClr val="phClr">
+                <a:tint val="40000"/>
+                <a:satMod val="350000"/>
+              </a:schemeClr>
+            </a:gs>
+            <a:gs pos="40000">
+              <a:schemeClr val="phClr">
+                <a:tint val="45000"/>
+                <a:shade val="99000"/>
+                <a:satMod val="350000"/>
+              </a:schemeClr>
+            </a:gs>
+            <a:gs pos="100000">
+              <a:schemeClr val="phClr">
+                <a:shade val="20000"/>
+                <a:satMod val="255000"/>
+              </a:schemeClr>
+            </a:gs>
+          </a:gsLst>
+          <a:path path="circle">
+            <a:fillToRect l="50000" t="-80000" r="50000" b="180000"/>
+          </a:path>
+        </a:gradFill>
+        <a:gradFill rotWithShape="1">
+          <a:gsLst>
+            <a:gs pos="0">
+              <a:schemeClr val="phClr">
+                <a:tint val="80000"/>
+                <a:satMod val="300000"/>
+              </a:schemeClr>
+            </a:gs>
+            <a:gs pos="100000">
+              <a:schemeClr val="phClr">
+                <a:shade val="30000"/>
+                <a:satMod val="200000"/>
+              </a:schemeClr>
+            </a:gs>
+          </a:gsLst>
+          <a:path path="circle">
+            <a:fillToRect l="50000" t="50000" r="50000" b="50000"/>
+          </a:path>
+        </a:gradFill>
+      </a:bgFillStyleLst>
+    </a:fmtScheme>
+  </a:themeElements>
+</a:theme>
+</file>
+
+<file path=ppt/theme/theme2.xml><?xml version="1.0" encoding="utf-8"?>
 <a:theme xmlns:a="http://schemas.openxmlformats.org/drawingml/2006/main" xmlns:r="http://schemas.openxmlformats.org/officeDocument/2006/relationships" name="Custom Theme">
   <a:themeElements>
     <a:clrScheme name="Default">
@@ -22715,283 +23056,4 @@
     </a:fmtScheme>
   </a:themeElements>
 </a:theme>
-</file>
-
-<file path=ppt/theme/theme2.xml><?xml version="1.0" encoding="utf-8"?>
-<a:theme xmlns:a="http://schemas.openxmlformats.org/drawingml/2006/main" xmlns:r="http://schemas.openxmlformats.org/officeDocument/2006/relationships" name="Office Theme">
-  <a:themeElements>
-    <a:clrScheme name="Office">
-      <a:dk1>
-        <a:srgbClr val="000000"/>
-      </a:dk1>
-      <a:lt1>
-        <a:srgbClr val="FFFFFF"/>
-      </a:lt1>
-      <a:dk2>
-        <a:srgbClr val="1F497D"/>
-      </a:dk2>
-      <a:lt2>
-        <a:srgbClr val="EEECE1"/>
-      </a:lt2>
-      <a:accent1>
-        <a:srgbClr val="4F81BD"/>
-      </a:accent1>
-      <a:accent2>
-        <a:srgbClr val="C0504D"/>
-      </a:accent2>
-      <a:accent3>
-        <a:srgbClr val="9BBB59"/>
-      </a:accent3>
-      <a:accent4>
-        <a:srgbClr val="8064A2"/>
-      </a:accent4>
-      <a:accent5>
-        <a:srgbClr val="4BACC6"/>
-      </a:accent5>
-      <a:accent6>
-        <a:srgbClr val="F79646"/>
-      </a:accent6>
-      <a:hlink>
-        <a:srgbClr val="0000FF"/>
-      </a:hlink>
-      <a:folHlink>
-        <a:srgbClr val="800080"/>
-      </a:folHlink>
-    </a:clrScheme>
-    <a:fontScheme name="Office">
-      <a:majorFont>
-        <a:latin typeface="Arial"/>
-        <a:ea typeface=""/>
-        <a:cs typeface=""/>
-        <a:font script="Jpan" typeface="ＭＳ Ｐゴシック"/>
-        <a:font script="Hang" typeface="맑은 고딕"/>
-        <a:font script="Hans" typeface="宋体"/>
-        <a:font script="Hant" typeface="新細明體"/>
-        <a:font script="Arab" typeface="Times New Roman"/>
-        <a:font script="Hebr" typeface="Times New Roman"/>
-        <a:font script="Thai" typeface="Angsana New"/>
-        <a:font script="Ethi" typeface="Nyala"/>
-        <a:font script="Beng" typeface="Vrinda"/>
-        <a:font script="Gujr" typeface="Shruti"/>
-        <a:font script="Khmr" typeface="MoolBoran"/>
-        <a:font script="Knda" typeface="Tunga"/>
-        <a:font script="Guru" typeface="Raavi"/>
-        <a:font script="Cans" typeface="Euphemia"/>
-        <a:font script="Cher" typeface="Plantagenet Cherokee"/>
-        <a:font script="Yiii" typeface="Microsoft Yi Baiti"/>
-        <a:font script="Tibt" typeface="Microsoft Himalaya"/>
-        <a:font script="Thaa" typeface="MV Boli"/>
-        <a:font script="Deva" typeface="Mangal"/>
-        <a:font script="Telu" typeface="Gautami"/>
-        <a:font script="Taml" typeface="Latha"/>
-        <a:font script="Syrc" typeface="Estrangelo Edessa"/>
-        <a:font script="Orya" typeface="Kalinga"/>
-        <a:font script="Mlym" typeface="Kartika"/>
-        <a:font script="Laoo" typeface="DokChampa"/>
-        <a:font script="Sinh" typeface="Iskoola Pota"/>
-        <a:font script="Mong" typeface="Mongolian Baiti"/>
-        <a:font script="Viet" typeface="Times New Roman"/>
-        <a:font script="Uigh" typeface="Microsoft Uighur"/>
-        <a:font script="Geor" typeface="Sylfaen"/>
-      </a:majorFont>
-      <a:minorFont>
-        <a:latin typeface="Arial"/>
-        <a:ea typeface=""/>
-        <a:cs typeface=""/>
-        <a:font script="Jpan" typeface="ＭＳ Ｐゴシック"/>
-        <a:font script="Hang" typeface="맑은 고딕"/>
-        <a:font script="Hans" typeface="宋体"/>
-        <a:font script="Hant" typeface="新細明體"/>
-        <a:font script="Arab" typeface="Arial"/>
-        <a:font script="Hebr" typeface="Arial"/>
-        <a:font script="Thai" typeface="Cordia New"/>
-        <a:font script="Ethi" typeface="Nyala"/>
-        <a:font script="Beng" typeface="Vrinda"/>
-        <a:font script="Gujr" typeface="Shruti"/>
-        <a:font script="Khmr" typeface="DaunPenh"/>
-        <a:font script="Knda" typeface="Tunga"/>
-        <a:font script="Guru" typeface="Raavi"/>
-        <a:font script="Cans" typeface="Euphemia"/>
-        <a:font script="Cher" typeface="Plantagenet Cherokee"/>
-        <a:font script="Yiii" typeface="Microsoft Yi Baiti"/>
-        <a:font script="Tibt" typeface="Microsoft Himalaya"/>
-        <a:font script="Thaa" typeface="MV Boli"/>
-        <a:font script="Deva" typeface="Mangal"/>
-        <a:font script="Telu" typeface="Gautami"/>
-        <a:font script="Taml" typeface="Latha"/>
-        <a:font script="Syrc" typeface="Estrangelo Edessa"/>
-        <a:font script="Orya" typeface="Kalinga"/>
-        <a:font script="Mlym" typeface="Kartika"/>
-        <a:font script="Laoo" typeface="DokChampa"/>
-        <a:font script="Sinh" typeface="Iskoola Pota"/>
-        <a:font script="Mong" typeface="Mongolian Baiti"/>
-        <a:font script="Viet" typeface="Arial"/>
-        <a:font script="Uigh" typeface="Microsoft Uighur"/>
-        <a:font script="Geor" typeface="Sylfaen"/>
-      </a:minorFont>
-    </a:fontScheme>
-    <a:fmtScheme name="Office">
-      <a:fillStyleLst>
-        <a:solidFill>
-          <a:schemeClr val="phClr"/>
-        </a:solidFill>
-        <a:gradFill rotWithShape="1">
-          <a:gsLst>
-            <a:gs pos="0">
-              <a:schemeClr val="phClr">
-                <a:tint val="50000"/>
-                <a:satMod val="300000"/>
-              </a:schemeClr>
-            </a:gs>
-            <a:gs pos="35000">
-              <a:schemeClr val="phClr">
-                <a:tint val="37000"/>
-                <a:satMod val="300000"/>
-              </a:schemeClr>
-            </a:gs>
-            <a:gs pos="100000">
-              <a:schemeClr val="phClr">
-                <a:tint val="15000"/>
-                <a:satMod val="350000"/>
-              </a:schemeClr>
-            </a:gs>
-          </a:gsLst>
-          <a:lin ang="16200000" scaled="1"/>
-        </a:gradFill>
-        <a:gradFill rotWithShape="1">
-          <a:gsLst>
-            <a:gs pos="0">
-              <a:schemeClr val="phClr">
-                <a:tint val="100000"/>
-                <a:shade val="100000"/>
-                <a:satMod val="130000"/>
-              </a:schemeClr>
-            </a:gs>
-            <a:gs pos="100000">
-              <a:schemeClr val="phClr">
-                <a:tint val="50000"/>
-                <a:shade val="100000"/>
-                <a:satMod val="350000"/>
-              </a:schemeClr>
-            </a:gs>
-          </a:gsLst>
-          <a:lin ang="16200000" scaled="0"/>
-        </a:gradFill>
-      </a:fillStyleLst>
-      <a:lnStyleLst>
-        <a:ln w="9525" cap="flat" cmpd="sng" algn="ctr">
-          <a:solidFill>
-            <a:schemeClr val="phClr">
-              <a:shade val="95000"/>
-              <a:satMod val="105000"/>
-            </a:schemeClr>
-          </a:solidFill>
-          <a:prstDash val="solid"/>
-        </a:ln>
-        <a:ln w="25400" cap="flat" cmpd="sng" algn="ctr">
-          <a:solidFill>
-            <a:schemeClr val="phClr"/>
-          </a:solidFill>
-          <a:prstDash val="solid"/>
-        </a:ln>
-        <a:ln w="38100" cap="flat" cmpd="sng" algn="ctr">
-          <a:solidFill>
-            <a:schemeClr val="phClr"/>
-          </a:solidFill>
-          <a:prstDash val="solid"/>
-        </a:ln>
-      </a:lnStyleLst>
-      <a:effectStyleLst>
-        <a:effectStyle>
-          <a:effectLst>
-            <a:outerShdw blurRad="40000" dist="20000" dir="5400000" rotWithShape="0">
-              <a:srgbClr val="000000">
-                <a:alpha val="38000"/>
-              </a:srgbClr>
-            </a:outerShdw>
-          </a:effectLst>
-        </a:effectStyle>
-        <a:effectStyle>
-          <a:effectLst>
-            <a:outerShdw blurRad="40000" dist="23000" dir="5400000" rotWithShape="0">
-              <a:srgbClr val="000000">
-                <a:alpha val="35000"/>
-              </a:srgbClr>
-            </a:outerShdw>
-          </a:effectLst>
-        </a:effectStyle>
-        <a:effectStyle>
-          <a:effectLst>
-            <a:outerShdw blurRad="40000" dist="23000" dir="5400000" rotWithShape="0">
-              <a:srgbClr val="000000">
-                <a:alpha val="35000"/>
-              </a:srgbClr>
-            </a:outerShdw>
-          </a:effectLst>
-          <a:scene3d>
-            <a:camera prst="orthographicFront">
-              <a:rot lat="0" lon="0" rev="0"/>
-            </a:camera>
-            <a:lightRig rig="threePt" dir="t">
-              <a:rot lat="0" lon="0" rev="1200000"/>
-            </a:lightRig>
-          </a:scene3d>
-          <a:sp3d>
-            <a:bevelT w="63500" h="25400"/>
-          </a:sp3d>
-        </a:effectStyle>
-      </a:effectStyleLst>
-      <a:bgFillStyleLst>
-        <a:solidFill>
-          <a:schemeClr val="phClr"/>
-        </a:solidFill>
-        <a:gradFill rotWithShape="1">
-          <a:gsLst>
-            <a:gs pos="0">
-              <a:schemeClr val="phClr">
-                <a:tint val="40000"/>
-                <a:satMod val="350000"/>
-              </a:schemeClr>
-            </a:gs>
-            <a:gs pos="40000">
-              <a:schemeClr val="phClr">
-                <a:tint val="45000"/>
-                <a:shade val="99000"/>
-                <a:satMod val="350000"/>
-              </a:schemeClr>
-            </a:gs>
-            <a:gs pos="100000">
-              <a:schemeClr val="phClr">
-                <a:shade val="20000"/>
-                <a:satMod val="255000"/>
-              </a:schemeClr>
-            </a:gs>
-          </a:gsLst>
-          <a:path path="circle">
-            <a:fillToRect l="50000" t="-80000" r="50000" b="180000"/>
-          </a:path>
-        </a:gradFill>
-        <a:gradFill rotWithShape="1">
-          <a:gsLst>
-            <a:gs pos="0">
-              <a:schemeClr val="phClr">
-                <a:tint val="80000"/>
-                <a:satMod val="300000"/>
-              </a:schemeClr>
-            </a:gs>
-            <a:gs pos="100000">
-              <a:schemeClr val="phClr">
-                <a:shade val="30000"/>
-                <a:satMod val="200000"/>
-              </a:schemeClr>
-            </a:gs>
-          </a:gsLst>
-          <a:path path="circle">
-            <a:fillToRect l="50000" t="50000" r="50000" b="50000"/>
-          </a:path>
-        </a:gradFill>
-      </a:bgFillStyleLst>
-    </a:fmtScheme>
-  </a:themeElements>
-</a:theme>
 </file>
</xml_diff>

<commit_message>
commit updated Readme with images
</commit_message>
<xml_diff>
--- a/Documentation/Release Plan Presentation.pptx
+++ b/Documentation/Release Plan Presentation.pptx
@@ -311,8 +311,8 @@
             </a:solidFill>
             <a:prstDash val="solid"/>
             <a:round/>
-            <a:headEnd len="med" w="med" type="none"/>
-            <a:tailEnd len="med" w="med" type="none"/>
+            <a:headEnd len="sm" w="sm" type="none"/>
+            <a:tailEnd len="sm" w="sm" type="none"/>
           </a:ln>
         </p:spPr>
       </p:sp>
@@ -788,8 +788,8 @@
             </a:solidFill>
             <a:prstDash val="solid"/>
             <a:round/>
-            <a:headEnd len="med" w="med" type="none"/>
-            <a:tailEnd len="med" w="med" type="none"/>
+            <a:headEnd len="sm" w="sm" type="none"/>
+            <a:tailEnd len="sm" w="sm" type="none"/>
           </a:ln>
         </p:spPr>
       </p:sp>
@@ -902,8 +902,8 @@
             </a:solidFill>
             <a:prstDash val="solid"/>
             <a:round/>
-            <a:headEnd len="med" w="med" type="none"/>
-            <a:tailEnd len="med" w="med" type="none"/>
+            <a:headEnd len="sm" w="sm" type="none"/>
+            <a:tailEnd len="sm" w="sm" type="none"/>
           </a:ln>
         </p:spPr>
       </p:sp>
@@ -920,7 +920,7 @@
   <p:cSld>
     <p:spTree>
       <p:nvGrpSpPr>
-        <p:cNvPr id="170" name="Shape 170"/>
+        <p:cNvPr id="172" name="Shape 172"/>
         <p:cNvGrpSpPr/>
         <p:nvPr/>
       </p:nvGrpSpPr>
@@ -934,7 +934,7 @@
       </p:grpSpPr>
       <p:sp>
         <p:nvSpPr>
-          <p:cNvPr id="171" name="Shape 171"/>
+          <p:cNvPr id="173" name="Shape 173"/>
           <p:cNvSpPr txBox="1"/>
           <p:nvPr>
             <p:ph idx="1" type="body"/>
@@ -979,7 +979,7 @@
       </p:sp>
       <p:sp>
         <p:nvSpPr>
-          <p:cNvPr id="172" name="Shape 172"/>
+          <p:cNvPr id="174" name="Shape 174"/>
           <p:cNvSpPr/>
           <p:nvPr>
             <p:ph idx="2" type="sldImg"/>
@@ -1016,8 +1016,8 @@
             </a:solidFill>
             <a:prstDash val="solid"/>
             <a:round/>
-            <a:headEnd len="med" w="med" type="none"/>
-            <a:tailEnd len="med" w="med" type="none"/>
+            <a:headEnd len="sm" w="sm" type="none"/>
+            <a:tailEnd len="sm" w="sm" type="none"/>
           </a:ln>
         </p:spPr>
       </p:sp>
@@ -1034,7 +1034,7 @@
   <p:cSld>
     <p:spTree>
       <p:nvGrpSpPr>
-        <p:cNvPr id="181" name="Shape 181"/>
+        <p:cNvPr id="183" name="Shape 183"/>
         <p:cNvGrpSpPr/>
         <p:nvPr/>
       </p:nvGrpSpPr>
@@ -1048,7 +1048,7 @@
       </p:grpSpPr>
       <p:sp>
         <p:nvSpPr>
-          <p:cNvPr id="182" name="Shape 182"/>
+          <p:cNvPr id="184" name="Shape 184"/>
           <p:cNvSpPr txBox="1"/>
           <p:nvPr>
             <p:ph idx="1" type="body"/>
@@ -1093,7 +1093,7 @@
       </p:sp>
       <p:sp>
         <p:nvSpPr>
-          <p:cNvPr id="183" name="Shape 183"/>
+          <p:cNvPr id="185" name="Shape 185"/>
           <p:cNvSpPr/>
           <p:nvPr>
             <p:ph idx="2" type="sldImg"/>
@@ -1130,8 +1130,8 @@
             </a:solidFill>
             <a:prstDash val="solid"/>
             <a:round/>
-            <a:headEnd len="med" w="med" type="none"/>
-            <a:tailEnd len="med" w="med" type="none"/>
+            <a:headEnd len="sm" w="sm" type="none"/>
+            <a:tailEnd len="sm" w="sm" type="none"/>
           </a:ln>
         </p:spPr>
       </p:sp>
@@ -1244,8 +1244,8 @@
             </a:solidFill>
             <a:prstDash val="solid"/>
             <a:round/>
-            <a:headEnd len="med" w="med" type="none"/>
-            <a:tailEnd len="med" w="med" type="none"/>
+            <a:headEnd len="sm" w="sm" type="none"/>
+            <a:tailEnd len="sm" w="sm" type="none"/>
           </a:ln>
         </p:spPr>
       </p:sp>
@@ -1358,8 +1358,8 @@
             </a:solidFill>
             <a:prstDash val="solid"/>
             <a:round/>
-            <a:headEnd len="med" w="med" type="none"/>
-            <a:tailEnd len="med" w="med" type="none"/>
+            <a:headEnd len="sm" w="sm" type="none"/>
+            <a:tailEnd len="sm" w="sm" type="none"/>
           </a:ln>
         </p:spPr>
       </p:sp>
@@ -1472,8 +1472,8 @@
             </a:solidFill>
             <a:prstDash val="solid"/>
             <a:round/>
-            <a:headEnd len="med" w="med" type="none"/>
-            <a:tailEnd len="med" w="med" type="none"/>
+            <a:headEnd len="sm" w="sm" type="none"/>
+            <a:tailEnd len="sm" w="sm" type="none"/>
           </a:ln>
         </p:spPr>
       </p:sp>
@@ -1586,8 +1586,8 @@
             </a:solidFill>
             <a:prstDash val="solid"/>
             <a:round/>
-            <a:headEnd len="med" w="med" type="none"/>
-            <a:tailEnd len="med" w="med" type="none"/>
+            <a:headEnd len="sm" w="sm" type="none"/>
+            <a:tailEnd len="sm" w="sm" type="none"/>
           </a:ln>
         </p:spPr>
       </p:sp>
@@ -1700,8 +1700,8 @@
             </a:solidFill>
             <a:prstDash val="solid"/>
             <a:round/>
-            <a:headEnd len="med" w="med" type="none"/>
-            <a:tailEnd len="med" w="med" type="none"/>
+            <a:headEnd len="sm" w="sm" type="none"/>
+            <a:tailEnd len="sm" w="sm" type="none"/>
           </a:ln>
         </p:spPr>
       </p:sp>
@@ -1814,8 +1814,8 @@
             </a:solidFill>
             <a:prstDash val="solid"/>
             <a:round/>
-            <a:headEnd len="med" w="med" type="none"/>
-            <a:tailEnd len="med" w="med" type="none"/>
+            <a:headEnd len="sm" w="sm" type="none"/>
+            <a:tailEnd len="sm" w="sm" type="none"/>
           </a:ln>
         </p:spPr>
       </p:sp>
@@ -1928,8 +1928,8 @@
             </a:solidFill>
             <a:prstDash val="solid"/>
             <a:round/>
-            <a:headEnd len="med" w="med" type="none"/>
-            <a:tailEnd len="med" w="med" type="none"/>
+            <a:headEnd len="sm" w="sm" type="none"/>
+            <a:tailEnd len="sm" w="sm" type="none"/>
           </a:ln>
         </p:spPr>
       </p:sp>
@@ -2042,8 +2042,8 @@
             </a:solidFill>
             <a:prstDash val="solid"/>
             <a:round/>
-            <a:headEnd len="med" w="med" type="none"/>
-            <a:tailEnd len="med" w="med" type="none"/>
+            <a:headEnd len="sm" w="sm" type="none"/>
+            <a:tailEnd len="sm" w="sm" type="none"/>
           </a:ln>
         </p:spPr>
       </p:sp>
@@ -20187,16 +20187,25 @@
               <a:buNone/>
             </a:pPr>
             <a:r>
-              <a:rPr b="0" i="0" lang="en-US" sz="4000" u="none" cap="none" strike="noStrike">
-                <a:solidFill>
-                  <a:schemeClr val="dk1"/>
-                </a:solidFill>
+              <a:rPr lang="en-US" sz="4000">
                 <a:latin typeface="Times New Roman"/>
                 <a:ea typeface="Times New Roman"/>
                 <a:cs typeface="Times New Roman"/>
                 <a:sym typeface="Times New Roman"/>
               </a:rPr>
-              <a:t>January 17, 2018</a:t>
+              <a:t>March 11</a:t>
+            </a:r>
+            <a:r>
+              <a:rPr b="0" i="0" lang="en-US" sz="4000" u="none" cap="none" strike="noStrike">
+                <a:solidFill>
+                  <a:schemeClr val="dk1"/>
+                </a:solidFill>
+                <a:latin typeface="Times New Roman"/>
+                <a:ea typeface="Times New Roman"/>
+                <a:cs typeface="Times New Roman"/>
+                <a:sym typeface="Times New Roman"/>
+              </a:rPr>
+              <a:t>, 2018</a:t>
             </a:r>
             <a:endParaRPr b="0" i="0" sz="4000" u="none" cap="none" strike="noStrike">
               <a:solidFill>
@@ -20477,7 +20486,7 @@
         <p:spPr>
           <a:xfrm>
             <a:off x="457200" y="2133600"/>
-            <a:ext cx="8229600" cy="3992562"/>
+            <a:ext cx="8229600" cy="3992700"/>
           </a:xfrm>
           <a:prstGeom prst="rect">
             <a:avLst/>
@@ -20646,10 +20655,44 @@
               <a:solidFill>
                 <a:schemeClr val="dk1"/>
               </a:solidFill>
-              <a:latin typeface="Calibri"/>
-              <a:ea typeface="Calibri"/>
-              <a:cs typeface="Calibri"/>
-              <a:sym typeface="Calibri"/>
+              <a:latin typeface="Times New Roman"/>
+              <a:ea typeface="Times New Roman"/>
+              <a:cs typeface="Times New Roman"/>
+              <a:sym typeface="Times New Roman"/>
+            </a:endParaRPr>
+          </a:p>
+          <a:p>
+            <a:pPr indent="-431800" lvl="0" marL="457200" marR="0" rtl="0" algn="l">
+              <a:lnSpc>
+                <a:spcPct val="100000"/>
+              </a:lnSpc>
+              <a:spcBef>
+                <a:spcPts val="0"/>
+              </a:spcBef>
+              <a:spcAft>
+                <a:spcPts val="0"/>
+              </a:spcAft>
+              <a:buClr>
+                <a:schemeClr val="dk1"/>
+              </a:buClr>
+              <a:buSzPts val="3200"/>
+              <a:buFont typeface="Times New Roman"/>
+              <a:buChar char="•"/>
+            </a:pPr>
+            <a:r>
+              <a:rPr lang="en-US">
+                <a:latin typeface="Times New Roman"/>
+                <a:ea typeface="Times New Roman"/>
+                <a:cs typeface="Times New Roman"/>
+                <a:sym typeface="Times New Roman"/>
+              </a:rPr>
+              <a:t>Boostrap</a:t>
+            </a:r>
+            <a:endParaRPr>
+              <a:latin typeface="Times New Roman"/>
+              <a:ea typeface="Times New Roman"/>
+              <a:cs typeface="Times New Roman"/>
+              <a:sym typeface="Times New Roman"/>
             </a:endParaRPr>
           </a:p>
           <a:p>
@@ -20755,6 +20798,61 @@
           </a:p>
         </p:txBody>
       </p:sp>
+      <p:pic>
+        <p:nvPicPr>
+          <p:cNvPr id="170" name="Shape 170"/>
+          <p:cNvPicPr preferRelativeResize="0"/>
+          <p:nvPr/>
+        </p:nvPicPr>
+        <p:blipFill rotWithShape="1">
+          <a:blip r:embed="rId4">
+            <a:alphaModFix/>
+          </a:blip>
+          <a:srcRect b="0" l="0" r="0" t="0"/>
+          <a:stretch/>
+        </p:blipFill>
+        <p:spPr>
+          <a:xfrm>
+            <a:off x="3998000" y="3826650"/>
+            <a:ext cx="3924675" cy="2299650"/>
+          </a:xfrm>
+          <a:prstGeom prst="rect">
+            <a:avLst/>
+          </a:prstGeom>
+          <a:noFill/>
+          <a:ln>
+            <a:noFill/>
+          </a:ln>
+        </p:spPr>
+      </p:pic>
+      <p:pic>
+        <p:nvPicPr>
+          <p:cNvPr id="171" name="Shape 171"/>
+          <p:cNvPicPr preferRelativeResize="0"/>
+          <p:nvPr/>
+        </p:nvPicPr>
+        <p:blipFill>
+          <a:blip r:embed="rId5">
+            <a:alphaModFix/>
+          </a:blip>
+          <a:stretch>
+            <a:fillRect/>
+          </a:stretch>
+        </p:blipFill>
+        <p:spPr>
+          <a:xfrm>
+            <a:off x="5045825" y="1984225"/>
+            <a:ext cx="3640967" cy="1974650"/>
+          </a:xfrm>
+          <a:prstGeom prst="rect">
+            <a:avLst/>
+          </a:prstGeom>
+          <a:noFill/>
+          <a:ln>
+            <a:noFill/>
+          </a:ln>
+        </p:spPr>
+      </p:pic>
     </p:spTree>
   </p:cSld>
   <p:clrMapOvr>
@@ -20768,7 +20866,7 @@
   <p:cSld>
     <p:spTree>
       <p:nvGrpSpPr>
-        <p:cNvPr id="173" name="Shape 173"/>
+        <p:cNvPr id="175" name="Shape 175"/>
         <p:cNvGrpSpPr/>
         <p:nvPr/>
       </p:nvGrpSpPr>
@@ -20782,7 +20880,7 @@
       </p:grpSpPr>
       <p:pic>
         <p:nvPicPr>
-          <p:cNvPr id="174" name="Shape 174"/>
+          <p:cNvPr id="176" name="Shape 176"/>
           <p:cNvPicPr preferRelativeResize="0"/>
           <p:nvPr/>
         </p:nvPicPr>
@@ -20809,7 +20907,7 @@
       </p:pic>
       <p:sp>
         <p:nvSpPr>
-          <p:cNvPr id="175" name="Shape 175"/>
+          <p:cNvPr id="177" name="Shape 177"/>
           <p:cNvSpPr txBox="1"/>
           <p:nvPr/>
         </p:nvSpPr>
@@ -20875,7 +20973,7 @@
       </p:sp>
       <p:sp>
         <p:nvSpPr>
-          <p:cNvPr id="176" name="Shape 176"/>
+          <p:cNvPr id="178" name="Shape 178"/>
           <p:cNvSpPr txBox="1"/>
           <p:nvPr>
             <p:ph type="title"/>
@@ -20943,7 +21041,7 @@
       </p:sp>
       <p:sp>
         <p:nvSpPr>
-          <p:cNvPr id="177" name="Shape 177"/>
+          <p:cNvPr id="179" name="Shape 179"/>
           <p:cNvSpPr txBox="1"/>
           <p:nvPr>
             <p:ph idx="1" type="body"/>
@@ -21082,7 +21180,7 @@
       </p:sp>
       <p:sp>
         <p:nvSpPr>
-          <p:cNvPr id="178" name="Shape 178"/>
+          <p:cNvPr id="180" name="Shape 180"/>
           <p:cNvSpPr txBox="1"/>
           <p:nvPr/>
         </p:nvSpPr>
@@ -21152,7 +21250,7 @@
       </p:sp>
       <p:pic>
         <p:nvPicPr>
-          <p:cNvPr id="179" name="Shape 179"/>
+          <p:cNvPr id="181" name="Shape 181"/>
           <p:cNvPicPr preferRelativeResize="0"/>
           <p:nvPr/>
         </p:nvPicPr>
@@ -21179,7 +21277,7 @@
       </p:pic>
       <p:sp>
         <p:nvSpPr>
-          <p:cNvPr id="180" name="Shape 180"/>
+          <p:cNvPr id="182" name="Shape 182"/>
           <p:cNvSpPr txBox="1"/>
           <p:nvPr/>
         </p:nvSpPr>
@@ -21300,7 +21398,7 @@
   <p:cSld>
     <p:spTree>
       <p:nvGrpSpPr>
-        <p:cNvPr id="184" name="Shape 184"/>
+        <p:cNvPr id="186" name="Shape 186"/>
         <p:cNvGrpSpPr/>
         <p:nvPr/>
       </p:nvGrpSpPr>
@@ -21314,7 +21412,7 @@
       </p:grpSpPr>
       <p:pic>
         <p:nvPicPr>
-          <p:cNvPr id="185" name="Shape 185"/>
+          <p:cNvPr id="187" name="Shape 187"/>
           <p:cNvPicPr preferRelativeResize="0"/>
           <p:nvPr/>
         </p:nvPicPr>
@@ -21341,7 +21439,7 @@
       </p:pic>
       <p:sp>
         <p:nvSpPr>
-          <p:cNvPr id="186" name="Shape 186"/>
+          <p:cNvPr id="188" name="Shape 188"/>
           <p:cNvSpPr txBox="1"/>
           <p:nvPr/>
         </p:nvSpPr>
@@ -21407,7 +21505,7 @@
       </p:sp>
       <p:sp>
         <p:nvSpPr>
-          <p:cNvPr id="187" name="Shape 187"/>
+          <p:cNvPr id="189" name="Shape 189"/>
           <p:cNvSpPr txBox="1"/>
           <p:nvPr>
             <p:ph type="title"/>
@@ -21475,7 +21573,7 @@
       </p:sp>
       <p:sp>
         <p:nvSpPr>
-          <p:cNvPr id="188" name="Shape 188"/>
+          <p:cNvPr id="190" name="Shape 190"/>
           <p:cNvSpPr txBox="1"/>
           <p:nvPr>
             <p:ph idx="1" type="body"/>
@@ -21558,16 +21656,13 @@
               <a:buChar char="•"/>
             </a:pPr>
             <a:r>
-              <a:rPr b="0" i="0" lang="en-US" sz="3200" u="none" cap="none" strike="noStrike">
-                <a:solidFill>
-                  <a:schemeClr val="dk1"/>
-                </a:solidFill>
+              <a:rPr lang="en-US">
                 <a:latin typeface="Times New Roman"/>
                 <a:ea typeface="Times New Roman"/>
                 <a:cs typeface="Times New Roman"/>
                 <a:sym typeface="Times New Roman"/>
               </a:rPr>
-              <a:t>Codeshare.io</a:t>
+              <a:t>Github</a:t>
             </a:r>
             <a:endParaRPr b="0" i="0" sz="3200" u="none" cap="none" strike="noStrike">
               <a:solidFill>
@@ -21614,7 +21709,7 @@
       </p:sp>
       <p:sp>
         <p:nvSpPr>
-          <p:cNvPr id="189" name="Shape 189"/>
+          <p:cNvPr id="191" name="Shape 191"/>
           <p:cNvSpPr txBox="1"/>
           <p:nvPr/>
         </p:nvSpPr>
@@ -21682,36 +21777,9 @@
           </a:p>
         </p:txBody>
       </p:sp>
-      <p:pic>
-        <p:nvPicPr>
-          <p:cNvPr id="190" name="Shape 190"/>
-          <p:cNvPicPr preferRelativeResize="0"/>
-          <p:nvPr/>
-        </p:nvPicPr>
-        <p:blipFill rotWithShape="1">
-          <a:blip r:embed="rId4">
-            <a:alphaModFix/>
-          </a:blip>
-          <a:srcRect b="0" l="0" r="0" t="0"/>
-          <a:stretch/>
-        </p:blipFill>
-        <p:spPr>
-          <a:xfrm>
-            <a:off x="533400" y="3256850"/>
-            <a:ext cx="6062501" cy="2628100"/>
-          </a:xfrm>
-          <a:prstGeom prst="rect">
-            <a:avLst/>
-          </a:prstGeom>
-          <a:noFill/>
-          <a:ln>
-            <a:noFill/>
-          </a:ln>
-        </p:spPr>
-      </p:pic>
       <p:sp>
         <p:nvSpPr>
-          <p:cNvPr id="191" name="Shape 191"/>
+          <p:cNvPr id="192" name="Shape 192"/>
           <p:cNvSpPr txBox="1"/>
           <p:nvPr/>
         </p:nvSpPr>
@@ -21764,17 +21832,21 @@
               <a:t>Image source via: </a:t>
             </a:r>
             <a:r>
-              <a:rPr b="0" i="0" lang="en-US" sz="1400" u="sng" cap="none" strike="noStrike">
+              <a:rPr lang="en-US" u="sng">
                 <a:solidFill>
                   <a:schemeClr val="hlink"/>
                 </a:solidFill>
-                <a:latin typeface="Arial"/>
-                <a:ea typeface="Arial"/>
-                <a:cs typeface="Arial"/>
-                <a:sym typeface="Arial"/>
-                <a:hlinkClick r:id="rId5"/>
+                <a:hlinkClick r:id="rId4"/>
               </a:rPr>
-              <a:t>https://codeshare.io/</a:t>
+              <a:t>https://www.pinterest.com/pin/129619295496727517/</a:t>
+            </a:r>
+            <a:r>
+              <a:rPr lang="en-US" u="none">
+                <a:solidFill>
+                  <a:srgbClr val="000000"/>
+                </a:solidFill>
+              </a:rPr>
+              <a:t> </a:t>
             </a:r>
             <a:endParaRPr b="0" i="0" sz="1400" u="none" cap="none" strike="noStrike">
               <a:solidFill>
@@ -21819,6 +21891,34 @@
           </a:p>
         </p:txBody>
       </p:sp>
+      <p:pic>
+        <p:nvPicPr>
+          <p:cNvPr id="193" name="Shape 193"/>
+          <p:cNvPicPr preferRelativeResize="0"/>
+          <p:nvPr/>
+        </p:nvPicPr>
+        <p:blipFill>
+          <a:blip r:embed="rId5">
+            <a:alphaModFix/>
+          </a:blip>
+          <a:stretch>
+            <a:fillRect/>
+          </a:stretch>
+        </p:blipFill>
+        <p:spPr>
+          <a:xfrm>
+            <a:off x="4032000" y="2641046"/>
+            <a:ext cx="3487625" cy="3345401"/>
+          </a:xfrm>
+          <a:prstGeom prst="rect">
+            <a:avLst/>
+          </a:prstGeom>
+          <a:noFill/>
+          <a:ln>
+            <a:noFill/>
+          </a:ln>
+        </p:spPr>
+      </p:pic>
     </p:spTree>
   </p:cSld>
   <p:clrMapOvr>
@@ -22086,7 +22186,7 @@
         <p:spPr>
           <a:xfrm>
             <a:off x="457200" y="2286000"/>
-            <a:ext cx="8229600" cy="3840162"/>
+            <a:ext cx="8229600" cy="3840300"/>
           </a:xfrm>
           <a:prstGeom prst="rect">
             <a:avLst/>
@@ -22185,7 +22285,7 @@
             </a:endParaRPr>
           </a:p>
           <a:p>
-            <a:pPr indent="-182562" lvl="1" marL="741362" marR="0" rtl="0" algn="l">
+            <a:pPr indent="-176212" lvl="1" marL="741362" rtl="0">
               <a:lnSpc>
                 <a:spcPct val="115000"/>
               </a:lnSpc>
@@ -22198,34 +22298,28 @@
               <a:buClr>
                 <a:schemeClr val="dk1"/>
               </a:buClr>
-              <a:buSzPts val="1200"/>
-              <a:buFont typeface="Times New Roman"/>
+              <a:buSzPts val="1100"/>
+              <a:buFont typeface="Arial"/>
               <a:buChar char="–"/>
             </a:pPr>
             <a:r>
-              <a:rPr b="0" i="0" lang="en-US" sz="1200" u="none" cap="none" strike="noStrike">
-                <a:solidFill>
-                  <a:schemeClr val="dk1"/>
-                </a:solidFill>
-                <a:latin typeface="Times New Roman"/>
-                <a:ea typeface="Times New Roman"/>
-                <a:cs typeface="Times New Roman"/>
-                <a:sym typeface="Times New Roman"/>
+              <a:rPr lang="en-US" sz="1100">
+                <a:latin typeface="Arial"/>
+                <a:ea typeface="Arial"/>
+                <a:cs typeface="Arial"/>
+                <a:sym typeface="Arial"/>
               </a:rPr>
-              <a:t>Be able to display paths that were created over time by UC Santa Cruz people</a:t>
+              <a:t>Be able to represent graph data as a readable file</a:t>
             </a:r>
-            <a:endParaRPr b="0" i="0" sz="1200" u="none" cap="none" strike="noStrike">
-              <a:solidFill>
-                <a:schemeClr val="dk1"/>
-              </a:solidFill>
-              <a:latin typeface="Times New Roman"/>
-              <a:ea typeface="Times New Roman"/>
-              <a:cs typeface="Times New Roman"/>
-              <a:sym typeface="Times New Roman"/>
+            <a:endParaRPr sz="1100">
+              <a:latin typeface="Arial"/>
+              <a:ea typeface="Arial"/>
+              <a:cs typeface="Arial"/>
+              <a:sym typeface="Arial"/>
             </a:endParaRPr>
           </a:p>
           <a:p>
-            <a:pPr indent="-182562" lvl="1" marL="741362" marR="0" rtl="0" algn="l">
+            <a:pPr indent="-176212" lvl="1" marL="741362" rtl="0">
               <a:lnSpc>
                 <a:spcPct val="115000"/>
               </a:lnSpc>
@@ -22238,34 +22332,28 @@
               <a:buClr>
                 <a:schemeClr val="dk1"/>
               </a:buClr>
-              <a:buSzPts val="1200"/>
-              <a:buFont typeface="Times New Roman"/>
+              <a:buSzPts val="1100"/>
+              <a:buFont typeface="Arial"/>
               <a:buChar char="–"/>
             </a:pPr>
             <a:r>
-              <a:rPr b="0" i="0" lang="en-US" sz="1200" u="none" cap="none" strike="noStrike">
-                <a:solidFill>
-                  <a:schemeClr val="dk1"/>
-                </a:solidFill>
-                <a:latin typeface="Times New Roman"/>
-                <a:ea typeface="Times New Roman"/>
-                <a:cs typeface="Times New Roman"/>
-                <a:sym typeface="Times New Roman"/>
+              <a:rPr lang="en-US" sz="1100">
+                <a:latin typeface="Arial"/>
+                <a:ea typeface="Arial"/>
+                <a:cs typeface="Arial"/>
+                <a:sym typeface="Arial"/>
               </a:rPr>
-              <a:t>Be able to represent graph data as a readable file</a:t>
+              <a:t>Be able to organize key locations at UC Santa Cruz</a:t>
             </a:r>
-            <a:endParaRPr b="0" i="0" sz="1200" u="none" cap="none" strike="noStrike">
-              <a:solidFill>
-                <a:schemeClr val="dk1"/>
-              </a:solidFill>
-              <a:latin typeface="Times New Roman"/>
-              <a:ea typeface="Times New Roman"/>
-              <a:cs typeface="Times New Roman"/>
-              <a:sym typeface="Times New Roman"/>
+            <a:endParaRPr sz="1100">
+              <a:latin typeface="Arial"/>
+              <a:ea typeface="Arial"/>
+              <a:cs typeface="Arial"/>
+              <a:sym typeface="Arial"/>
             </a:endParaRPr>
           </a:p>
           <a:p>
-            <a:pPr indent="-182562" lvl="1" marL="741362" marR="0" rtl="0" algn="l">
+            <a:pPr indent="-176212" lvl="1" marL="741362" rtl="0">
               <a:lnSpc>
                 <a:spcPct val="115000"/>
               </a:lnSpc>
@@ -22278,34 +22366,28 @@
               <a:buClr>
                 <a:schemeClr val="dk1"/>
               </a:buClr>
-              <a:buSzPts val="1200"/>
-              <a:buFont typeface="Times New Roman"/>
+              <a:buSzPts val="1100"/>
+              <a:buFont typeface="Arial"/>
               <a:buChar char="–"/>
             </a:pPr>
             <a:r>
-              <a:rPr b="0" i="0" lang="en-US" sz="1200" u="none" cap="none" strike="noStrike">
-                <a:solidFill>
-                  <a:schemeClr val="dk1"/>
-                </a:solidFill>
-                <a:latin typeface="Times New Roman"/>
-                <a:ea typeface="Times New Roman"/>
-                <a:cs typeface="Times New Roman"/>
-                <a:sym typeface="Times New Roman"/>
+              <a:rPr lang="en-US" sz="1100">
+                <a:latin typeface="Arial"/>
+                <a:ea typeface="Arial"/>
+                <a:cs typeface="Arial"/>
+                <a:sym typeface="Arial"/>
               </a:rPr>
-              <a:t>Be able to organize key locations at UC Santa Cruz</a:t>
+              <a:t>Be able to collect distances and time between two locations</a:t>
             </a:r>
-            <a:endParaRPr b="0" i="0" sz="1200" u="none" cap="none" strike="noStrike">
-              <a:solidFill>
-                <a:schemeClr val="dk1"/>
-              </a:solidFill>
-              <a:latin typeface="Times New Roman"/>
-              <a:ea typeface="Times New Roman"/>
-              <a:cs typeface="Times New Roman"/>
-              <a:sym typeface="Times New Roman"/>
+            <a:endParaRPr sz="1100">
+              <a:latin typeface="Arial"/>
+              <a:ea typeface="Arial"/>
+              <a:cs typeface="Arial"/>
+              <a:sym typeface="Arial"/>
             </a:endParaRPr>
           </a:p>
           <a:p>
-            <a:pPr indent="-182562" lvl="1" marL="741362" marR="0" rtl="0" algn="l">
+            <a:pPr indent="-176212" lvl="1" marL="741362" rtl="0">
               <a:lnSpc>
                 <a:spcPct val="115000"/>
               </a:lnSpc>
@@ -22318,34 +22400,28 @@
               <a:buClr>
                 <a:schemeClr val="dk1"/>
               </a:buClr>
-              <a:buSzPts val="1200"/>
-              <a:buFont typeface="Times New Roman"/>
+              <a:buSzPts val="1100"/>
+              <a:buFont typeface="Arial"/>
               <a:buChar char="–"/>
             </a:pPr>
             <a:r>
-              <a:rPr b="0" i="0" lang="en-US" sz="1200" u="none" cap="none" strike="noStrike">
-                <a:solidFill>
-                  <a:schemeClr val="dk1"/>
-                </a:solidFill>
-                <a:latin typeface="Times New Roman"/>
-                <a:ea typeface="Times New Roman"/>
-                <a:cs typeface="Times New Roman"/>
-                <a:sym typeface="Times New Roman"/>
+              <a:rPr lang="en-US" sz="1100">
+                <a:latin typeface="Arial"/>
+                <a:ea typeface="Arial"/>
+                <a:cs typeface="Arial"/>
+                <a:sym typeface="Arial"/>
               </a:rPr>
-              <a:t>Be able to collect distances and time between two locations</a:t>
+              <a:t>Be able to have a visual representation if user is going the right direction</a:t>
             </a:r>
-            <a:endParaRPr b="0" i="0" sz="1200" u="none" cap="none" strike="noStrike">
-              <a:solidFill>
-                <a:schemeClr val="dk1"/>
-              </a:solidFill>
-              <a:latin typeface="Times New Roman"/>
-              <a:ea typeface="Times New Roman"/>
-              <a:cs typeface="Times New Roman"/>
-              <a:sym typeface="Times New Roman"/>
+            <a:endParaRPr sz="1100">
+              <a:latin typeface="Arial"/>
+              <a:ea typeface="Arial"/>
+              <a:cs typeface="Arial"/>
+              <a:sym typeface="Arial"/>
             </a:endParaRPr>
           </a:p>
           <a:p>
-            <a:pPr indent="-182562" lvl="1" marL="741362" marR="0" rtl="0" algn="l">
+            <a:pPr indent="-176212" lvl="1" marL="741362" rtl="0">
               <a:lnSpc>
                 <a:spcPct val="115000"/>
               </a:lnSpc>
@@ -22358,34 +22434,28 @@
               <a:buClr>
                 <a:schemeClr val="dk1"/>
               </a:buClr>
-              <a:buSzPts val="1200"/>
-              <a:buFont typeface="Times New Roman"/>
+              <a:buSzPts val="1100"/>
+              <a:buFont typeface="Arial"/>
               <a:buChar char="–"/>
             </a:pPr>
             <a:r>
-              <a:rPr b="0" i="0" lang="en-US" sz="1200" u="none" cap="none" strike="noStrike">
-                <a:solidFill>
-                  <a:schemeClr val="dk1"/>
-                </a:solidFill>
-                <a:latin typeface="Times New Roman"/>
-                <a:ea typeface="Times New Roman"/>
-                <a:cs typeface="Times New Roman"/>
-                <a:sym typeface="Times New Roman"/>
+              <a:rPr lang="en-US" sz="1100">
+                <a:latin typeface="Arial"/>
+                <a:ea typeface="Arial"/>
+                <a:cs typeface="Arial"/>
+                <a:sym typeface="Arial"/>
               </a:rPr>
-              <a:t>Be able to have a visual representation if user is going the right direction</a:t>
+              <a:t>Be able to find all nearby attractions at one location</a:t>
             </a:r>
-            <a:endParaRPr b="0" i="0" sz="1200" u="none" cap="none" strike="noStrike">
-              <a:solidFill>
-                <a:schemeClr val="dk1"/>
-              </a:solidFill>
-              <a:latin typeface="Times New Roman"/>
-              <a:ea typeface="Times New Roman"/>
-              <a:cs typeface="Times New Roman"/>
-              <a:sym typeface="Times New Roman"/>
+            <a:endParaRPr sz="1100">
+              <a:latin typeface="Arial"/>
+              <a:ea typeface="Arial"/>
+              <a:cs typeface="Arial"/>
+              <a:sym typeface="Arial"/>
             </a:endParaRPr>
           </a:p>
           <a:p>
-            <a:pPr indent="-182562" lvl="1" marL="741362" marR="0" rtl="0" algn="l">
+            <a:pPr indent="-176212" lvl="1" marL="741362" rtl="0">
               <a:lnSpc>
                 <a:spcPct val="115000"/>
               </a:lnSpc>
@@ -22398,34 +22468,28 @@
               <a:buClr>
                 <a:schemeClr val="dk1"/>
               </a:buClr>
-              <a:buSzPts val="1200"/>
-              <a:buFont typeface="Times New Roman"/>
+              <a:buSzPts val="1100"/>
+              <a:buFont typeface="Arial"/>
               <a:buChar char="–"/>
             </a:pPr>
             <a:r>
-              <a:rPr b="0" i="0" lang="en-US" sz="1200" u="none" cap="none" strike="noStrike">
-                <a:solidFill>
-                  <a:schemeClr val="dk1"/>
-                </a:solidFill>
-                <a:latin typeface="Times New Roman"/>
-                <a:ea typeface="Times New Roman"/>
-                <a:cs typeface="Times New Roman"/>
-                <a:sym typeface="Times New Roman"/>
+              <a:rPr lang="en-US" sz="1100">
+                <a:latin typeface="Arial"/>
+                <a:ea typeface="Arial"/>
+                <a:cs typeface="Arial"/>
+                <a:sym typeface="Arial"/>
               </a:rPr>
-              <a:t>Be able to find all nearby attractions at one location</a:t>
+              <a:t>Be able to organize product user experience layout</a:t>
             </a:r>
-            <a:endParaRPr b="0" i="0" sz="1200" u="none" cap="none" strike="noStrike">
-              <a:solidFill>
-                <a:schemeClr val="dk1"/>
-              </a:solidFill>
-              <a:latin typeface="Times New Roman"/>
-              <a:ea typeface="Times New Roman"/>
-              <a:cs typeface="Times New Roman"/>
-              <a:sym typeface="Times New Roman"/>
+            <a:endParaRPr sz="1100">
+              <a:latin typeface="Arial"/>
+              <a:ea typeface="Arial"/>
+              <a:cs typeface="Arial"/>
+              <a:sym typeface="Arial"/>
             </a:endParaRPr>
           </a:p>
           <a:p>
-            <a:pPr indent="-182562" lvl="1" marL="741362" marR="0" rtl="0" algn="l">
+            <a:pPr indent="-176212" lvl="1" marL="741362" rtl="0">
               <a:lnSpc>
                 <a:spcPct val="115000"/>
               </a:lnSpc>
@@ -22438,34 +22502,28 @@
               <a:buClr>
                 <a:schemeClr val="dk1"/>
               </a:buClr>
-              <a:buSzPts val="1200"/>
-              <a:buFont typeface="Times New Roman"/>
+              <a:buSzPts val="1100"/>
+              <a:buFont typeface="Arial"/>
               <a:buChar char="–"/>
             </a:pPr>
             <a:r>
-              <a:rPr b="0" i="0" lang="en-US" sz="1200" u="none" cap="none" strike="noStrike">
-                <a:solidFill>
-                  <a:schemeClr val="dk1"/>
-                </a:solidFill>
-                <a:latin typeface="Times New Roman"/>
-                <a:ea typeface="Times New Roman"/>
-                <a:cs typeface="Times New Roman"/>
-                <a:sym typeface="Times New Roman"/>
+              <a:rPr lang="en-US" sz="1100">
+                <a:latin typeface="Arial"/>
+                <a:ea typeface="Arial"/>
+                <a:cs typeface="Arial"/>
+                <a:sym typeface="Arial"/>
               </a:rPr>
-              <a:t>Be able to display building maps for every building on campus</a:t>
+              <a:t>Make the product visually appealing</a:t>
             </a:r>
-            <a:endParaRPr b="0" i="0" sz="1200" u="none" cap="none" strike="noStrike">
-              <a:solidFill>
-                <a:schemeClr val="dk1"/>
-              </a:solidFill>
-              <a:latin typeface="Times New Roman"/>
-              <a:ea typeface="Times New Roman"/>
-              <a:cs typeface="Times New Roman"/>
-              <a:sym typeface="Times New Roman"/>
+            <a:endParaRPr sz="1100">
+              <a:latin typeface="Arial"/>
+              <a:ea typeface="Arial"/>
+              <a:cs typeface="Arial"/>
+              <a:sym typeface="Arial"/>
             </a:endParaRPr>
           </a:p>
           <a:p>
-            <a:pPr indent="-182562" lvl="1" marL="741362" marR="0" rtl="0" algn="l">
+            <a:pPr indent="-176212" lvl="1" marL="741362" rtl="0">
               <a:lnSpc>
                 <a:spcPct val="115000"/>
               </a:lnSpc>
@@ -22478,34 +22536,28 @@
               <a:buClr>
                 <a:schemeClr val="dk1"/>
               </a:buClr>
-              <a:buSzPts val="1200"/>
-              <a:buFont typeface="Times New Roman"/>
+              <a:buSzPts val="1100"/>
+              <a:buFont typeface="Arial"/>
               <a:buChar char="–"/>
             </a:pPr>
             <a:r>
-              <a:rPr b="0" i="0" lang="en-US" sz="1200" u="none" cap="none" strike="noStrike">
-                <a:solidFill>
-                  <a:schemeClr val="dk1"/>
-                </a:solidFill>
-                <a:latin typeface="Times New Roman"/>
-                <a:ea typeface="Times New Roman"/>
-                <a:cs typeface="Times New Roman"/>
-                <a:sym typeface="Times New Roman"/>
+              <a:rPr lang="en-US" sz="1100">
+                <a:latin typeface="Arial"/>
+                <a:ea typeface="Arial"/>
+                <a:cs typeface="Arial"/>
+                <a:sym typeface="Arial"/>
               </a:rPr>
-              <a:t>Be able to organize product user experience layout</a:t>
+              <a:t>Create an About page</a:t>
             </a:r>
-            <a:endParaRPr b="0" i="0" sz="1200" u="none" cap="none" strike="noStrike">
-              <a:solidFill>
-                <a:schemeClr val="dk1"/>
-              </a:solidFill>
-              <a:latin typeface="Times New Roman"/>
-              <a:ea typeface="Times New Roman"/>
-              <a:cs typeface="Times New Roman"/>
-              <a:sym typeface="Times New Roman"/>
+            <a:endParaRPr sz="1100">
+              <a:latin typeface="Arial"/>
+              <a:ea typeface="Arial"/>
+              <a:cs typeface="Arial"/>
+              <a:sym typeface="Arial"/>
             </a:endParaRPr>
           </a:p>
           <a:p>
-            <a:pPr indent="-182562" lvl="1" marL="741362" marR="0" rtl="0" algn="l">
+            <a:pPr indent="-176212" lvl="1" marL="741362" rtl="0">
               <a:lnSpc>
                 <a:spcPct val="115000"/>
               </a:lnSpc>
@@ -22518,106 +22570,20 @@
               <a:buClr>
                 <a:schemeClr val="dk1"/>
               </a:buClr>
-              <a:buSzPts val="1200"/>
-              <a:buFont typeface="Times New Roman"/>
+              <a:buSzPts val="1100"/>
+              <a:buFont typeface="Arial"/>
               <a:buChar char="–"/>
             </a:pPr>
             <a:r>
-              <a:rPr b="0" i="0" lang="en-US" sz="1200" u="none" cap="none" strike="noStrike">
-                <a:solidFill>
-                  <a:schemeClr val="dk1"/>
-                </a:solidFill>
-                <a:latin typeface="Times New Roman"/>
-                <a:ea typeface="Times New Roman"/>
-                <a:cs typeface="Times New Roman"/>
-                <a:sym typeface="Times New Roman"/>
-              </a:rPr>
-              <a:t>Make the product visually appealing</a:t>
-            </a:r>
-            <a:endParaRPr b="0" i="0" sz="1200" u="none" cap="none" strike="noStrike">
-              <a:solidFill>
-                <a:schemeClr val="dk1"/>
-              </a:solidFill>
-              <a:latin typeface="Times New Roman"/>
-              <a:ea typeface="Times New Roman"/>
-              <a:cs typeface="Times New Roman"/>
-              <a:sym typeface="Times New Roman"/>
-            </a:endParaRPr>
-          </a:p>
-          <a:p>
-            <a:pPr indent="-182562" lvl="1" marL="741362" marR="0" rtl="0" algn="l">
-              <a:lnSpc>
-                <a:spcPct val="115000"/>
-              </a:lnSpc>
-              <a:spcBef>
-                <a:spcPts val="0"/>
-              </a:spcBef>
-              <a:spcAft>
-                <a:spcPts val="0"/>
-              </a:spcAft>
-              <a:buClr>
-                <a:schemeClr val="dk1"/>
-              </a:buClr>
-              <a:buSzPts val="1200"/>
-              <a:buFont typeface="Times New Roman"/>
-              <a:buChar char="–"/>
-            </a:pPr>
-            <a:r>
-              <a:rPr b="0" i="0" lang="en-US" sz="1200" u="none" cap="none" strike="noStrike">
-                <a:solidFill>
-                  <a:schemeClr val="dk1"/>
-                </a:solidFill>
-                <a:latin typeface="Times New Roman"/>
-                <a:ea typeface="Times New Roman"/>
-                <a:cs typeface="Times New Roman"/>
-                <a:sym typeface="Times New Roman"/>
-              </a:rPr>
-              <a:t>Create an About page</a:t>
-            </a:r>
-            <a:endParaRPr b="0" i="0" sz="1200" u="none" cap="none" strike="noStrike">
-              <a:solidFill>
-                <a:schemeClr val="dk1"/>
-              </a:solidFill>
-              <a:latin typeface="Times New Roman"/>
-              <a:ea typeface="Times New Roman"/>
-              <a:cs typeface="Times New Roman"/>
-              <a:sym typeface="Times New Roman"/>
-            </a:endParaRPr>
-          </a:p>
-          <a:p>
-            <a:pPr indent="-182562" lvl="1" marL="741362" marR="0" rtl="0" algn="l">
-              <a:lnSpc>
-                <a:spcPct val="115000"/>
-              </a:lnSpc>
-              <a:spcBef>
-                <a:spcPts val="0"/>
-              </a:spcBef>
-              <a:spcAft>
-                <a:spcPts val="0"/>
-              </a:spcAft>
-              <a:buClr>
-                <a:schemeClr val="dk1"/>
-              </a:buClr>
-              <a:buSzPts val="1200"/>
-              <a:buFont typeface="Times New Roman"/>
-              <a:buChar char="–"/>
-            </a:pPr>
-            <a:r>
-              <a:rPr b="0" i="0" lang="en-US" sz="1200" u="none" cap="none" strike="noStrike">
-                <a:solidFill>
-                  <a:schemeClr val="dk1"/>
-                </a:solidFill>
-                <a:latin typeface="Times New Roman"/>
-                <a:ea typeface="Times New Roman"/>
-                <a:cs typeface="Times New Roman"/>
-                <a:sym typeface="Times New Roman"/>
+              <a:rPr lang="en-US" sz="1100">
+                <a:latin typeface="Arial"/>
+                <a:ea typeface="Arial"/>
+                <a:cs typeface="Arial"/>
+                <a:sym typeface="Arial"/>
               </a:rPr>
               <a:t>Community submits additional known paths</a:t>
             </a:r>
-            <a:endParaRPr b="1" i="0" sz="1800" u="none" cap="none" strike="noStrike">
-              <a:solidFill>
-                <a:schemeClr val="dk1"/>
-              </a:solidFill>
+            <a:endParaRPr sz="1200">
               <a:latin typeface="Times New Roman"/>
               <a:ea typeface="Times New Roman"/>
               <a:cs typeface="Times New Roman"/>
@@ -22910,7 +22876,7 @@
             </a:endParaRPr>
           </a:p>
           <a:p>
-            <a:pPr indent="-342900" lvl="0" marL="457200" marR="0" rtl="0" algn="l">
+            <a:pPr indent="-342900" lvl="0" marL="457200" rtl="0">
               <a:lnSpc>
                 <a:spcPct val="115000"/>
               </a:lnSpc>
@@ -22924,48 +22890,42 @@
                 <a:schemeClr val="dk1"/>
               </a:buClr>
               <a:buSzPts val="1800"/>
-              <a:buFont typeface="Times New Roman"/>
+              <a:buFont typeface="Arial"/>
               <a:buChar char="•"/>
             </a:pPr>
             <a:r>
-              <a:rPr b="0" i="0" lang="en-US" sz="1800" u="none" cap="none" strike="noStrike">
-                <a:solidFill>
-                  <a:schemeClr val="dk1"/>
-                </a:solidFill>
-                <a:latin typeface="Times New Roman"/>
-                <a:ea typeface="Times New Roman"/>
-                <a:cs typeface="Times New Roman"/>
-                <a:sym typeface="Times New Roman"/>
+              <a:rPr lang="en-US" sz="1800">
+                <a:latin typeface="Arial"/>
+                <a:ea typeface="Arial"/>
+                <a:cs typeface="Arial"/>
+                <a:sym typeface="Arial"/>
               </a:rPr>
-              <a:t>(21 Points) </a:t>
+              <a:t>21 Points) </a:t>
             </a:r>
             <a:r>
-              <a:rPr b="0" i="0" lang="en-US" sz="1800" u="none" cap="none" strike="noStrike">
+              <a:rPr lang="en-US" sz="1800">
                 <a:solidFill>
                   <a:srgbClr val="24292E"/>
                 </a:solidFill>
                 <a:highlight>
                   <a:srgbClr val="FFFFFF"/>
                 </a:highlight>
-                <a:latin typeface="Times New Roman"/>
-                <a:ea typeface="Times New Roman"/>
-                <a:cs typeface="Times New Roman"/>
-                <a:sym typeface="Times New Roman"/>
+                <a:latin typeface="Arial"/>
+                <a:ea typeface="Arial"/>
+                <a:cs typeface="Arial"/>
+                <a:sym typeface="Arial"/>
               </a:rPr>
-              <a:t>As a Team, we need to figure out how to represent data so that our "Slugstra" Algorithm can run efficiently.</a:t>
+              <a:t>As a javascript developer, I need to develop the shortest path algorithm so that we can display the shortest path on a visualized map.</a:t>
             </a:r>
-            <a:endParaRPr b="0" i="0" sz="1800" u="none" cap="none" strike="noStrike">
-              <a:solidFill>
-                <a:schemeClr val="dk1"/>
-              </a:solidFill>
-              <a:latin typeface="Times New Roman"/>
-              <a:ea typeface="Times New Roman"/>
-              <a:cs typeface="Times New Roman"/>
-              <a:sym typeface="Times New Roman"/>
+            <a:endParaRPr sz="1800">
+              <a:latin typeface="Arial"/>
+              <a:ea typeface="Arial"/>
+              <a:cs typeface="Arial"/>
+              <a:sym typeface="Arial"/>
             </a:endParaRPr>
           </a:p>
           <a:p>
-            <a:pPr indent="-342900" lvl="0" marL="457200" marR="0" rtl="0" algn="l">
+            <a:pPr indent="-342900" lvl="0" marL="457200" rtl="0">
               <a:lnSpc>
                 <a:spcPct val="115000"/>
               </a:lnSpc>
@@ -22979,48 +22939,42 @@
                 <a:schemeClr val="dk1"/>
               </a:buClr>
               <a:buSzPts val="1800"/>
-              <a:buFont typeface="Times New Roman"/>
+              <a:buFont typeface="Arial"/>
               <a:buChar char="•"/>
             </a:pPr>
             <a:r>
-              <a:rPr b="0" i="0" lang="en-US" sz="1800" u="none" cap="none" strike="noStrike">
-                <a:solidFill>
-                  <a:schemeClr val="dk1"/>
-                </a:solidFill>
-                <a:latin typeface="Times New Roman"/>
-                <a:ea typeface="Times New Roman"/>
-                <a:cs typeface="Times New Roman"/>
-                <a:sym typeface="Times New Roman"/>
+              <a:rPr lang="en-US" sz="1800">
+                <a:latin typeface="Arial"/>
+                <a:ea typeface="Arial"/>
+                <a:cs typeface="Arial"/>
+                <a:sym typeface="Arial"/>
               </a:rPr>
               <a:t>(13 Points) </a:t>
             </a:r>
             <a:r>
-              <a:rPr b="0" i="0" lang="en-US" sz="1800" u="none" cap="none" strike="noStrike">
+              <a:rPr lang="en-US" sz="1800">
                 <a:solidFill>
                   <a:srgbClr val="24292E"/>
                 </a:solidFill>
                 <a:highlight>
                   <a:srgbClr val="FFFFFF"/>
                 </a:highlight>
-                <a:latin typeface="Times New Roman"/>
-                <a:ea typeface="Times New Roman"/>
-                <a:cs typeface="Times New Roman"/>
-                <a:sym typeface="Times New Roman"/>
+                <a:latin typeface="Arial"/>
+                <a:ea typeface="Arial"/>
+                <a:cs typeface="Arial"/>
+                <a:sym typeface="Arial"/>
               </a:rPr>
-              <a:t>As a Data Collector, I need to organize the UC Santa Cruz Map so that the program can run efficiently.</a:t>
+              <a:t>As a Data Manager, I want node and edge data so that I can organize our data efficiently.</a:t>
             </a:r>
-            <a:endParaRPr b="0" i="0" sz="1800" u="none" cap="none" strike="noStrike">
-              <a:solidFill>
-                <a:schemeClr val="dk1"/>
-              </a:solidFill>
-              <a:latin typeface="Times New Roman"/>
-              <a:ea typeface="Times New Roman"/>
-              <a:cs typeface="Times New Roman"/>
-              <a:sym typeface="Times New Roman"/>
+            <a:endParaRPr sz="1800">
+              <a:latin typeface="Arial"/>
+              <a:ea typeface="Arial"/>
+              <a:cs typeface="Arial"/>
+              <a:sym typeface="Arial"/>
             </a:endParaRPr>
           </a:p>
           <a:p>
-            <a:pPr indent="-342900" lvl="0" marL="457200" marR="0" rtl="0" algn="l">
+            <a:pPr indent="-342900" lvl="0" marL="457200" rtl="0">
               <a:lnSpc>
                 <a:spcPct val="115000"/>
               </a:lnSpc>
@@ -23034,40 +22988,57 @@
                 <a:schemeClr val="dk1"/>
               </a:buClr>
               <a:buSzPts val="1800"/>
-              <a:buFont typeface="Times New Roman"/>
+              <a:buFont typeface="Arial"/>
               <a:buChar char="•"/>
             </a:pPr>
             <a:r>
-              <a:rPr b="0" i="0" lang="en-US" sz="1800" u="none" cap="none" strike="noStrike">
-                <a:solidFill>
-                  <a:schemeClr val="dk1"/>
-                </a:solidFill>
-                <a:latin typeface="Times New Roman"/>
-                <a:ea typeface="Times New Roman"/>
-                <a:cs typeface="Times New Roman"/>
-                <a:sym typeface="Times New Roman"/>
+              <a:rPr lang="en-US" sz="1800">
+                <a:latin typeface="Arial"/>
+                <a:ea typeface="Arial"/>
+                <a:cs typeface="Arial"/>
+                <a:sym typeface="Arial"/>
               </a:rPr>
-              <a:t>(13 Points) </a:t>
+              <a:t>(3 Points) </a:t>
             </a:r>
             <a:r>
-              <a:rPr b="0" i="0" lang="en-US" sz="1800" u="none" cap="none" strike="noStrike">
+              <a:rPr lang="en-US" sz="1800">
                 <a:solidFill>
                   <a:srgbClr val="24292E"/>
                 </a:solidFill>
                 <a:highlight>
                   <a:srgbClr val="FFFFFF"/>
                 </a:highlight>
-                <a:latin typeface="Times New Roman"/>
-                <a:ea typeface="Times New Roman"/>
-                <a:cs typeface="Times New Roman"/>
-                <a:sym typeface="Times New Roman"/>
+                <a:latin typeface="Arial"/>
+                <a:ea typeface="Arial"/>
+                <a:cs typeface="Arial"/>
+                <a:sym typeface="Arial"/>
               </a:rPr>
-              <a:t>As a Data Collector, I need to collect distances and times between locations so that the program can run efficiently.</a:t>
+              <a:t>As a User, I want to have a visual representation if I am heading the right direction so that I don't get lost.</a:t>
             </a:r>
-            <a:endParaRPr b="0" i="0" sz="1800" u="none" cap="none" strike="noStrike">
-              <a:solidFill>
-                <a:schemeClr val="dk1"/>
-              </a:solidFill>
+            <a:endParaRPr sz="1800">
+              <a:latin typeface="Arial"/>
+              <a:ea typeface="Arial"/>
+              <a:cs typeface="Arial"/>
+              <a:sym typeface="Arial"/>
+            </a:endParaRPr>
+          </a:p>
+          <a:p>
+            <a:pPr indent="0" lvl="0" marL="0" marR="0" rtl="0" algn="l">
+              <a:lnSpc>
+                <a:spcPct val="115000"/>
+              </a:lnSpc>
+              <a:spcBef>
+                <a:spcPts val="0"/>
+              </a:spcBef>
+              <a:spcAft>
+                <a:spcPts val="0"/>
+              </a:spcAft>
+              <a:buNone/>
+            </a:pPr>
+            <a:r>
+              <a:t/>
+            </a:r>
+            <a:endParaRPr sz="1800">
               <a:latin typeface="Times New Roman"/>
               <a:ea typeface="Times New Roman"/>
               <a:cs typeface="Times New Roman"/>
@@ -23461,7 +23432,7 @@
             </a:endParaRPr>
           </a:p>
           <a:p>
-            <a:pPr indent="-342900" lvl="0" marL="457200" marR="0" rtl="0" algn="l">
+            <a:pPr indent="-342900" lvl="0" marL="457200" rtl="0">
               <a:lnSpc>
                 <a:spcPct val="115000"/>
               </a:lnSpc>
@@ -23475,51 +23446,42 @@
                 <a:schemeClr val="dk1"/>
               </a:buClr>
               <a:buSzPts val="1800"/>
-              <a:buFont typeface="Times New Roman"/>
+              <a:buFont typeface="Arial"/>
               <a:buChar char="•"/>
             </a:pPr>
             <a:r>
-              <a:rPr b="0" i="0" lang="en-US" sz="1800" u="none" cap="none" strike="noStrike">
-                <a:solidFill>
-                  <a:schemeClr val="dk1"/>
-                </a:solidFill>
-                <a:latin typeface="Times New Roman"/>
-                <a:ea typeface="Times New Roman"/>
-                <a:cs typeface="Times New Roman"/>
-                <a:sym typeface="Times New Roman"/>
+              <a:rPr lang="en-US" sz="1800">
+                <a:latin typeface="Arial"/>
+                <a:ea typeface="Arial"/>
+                <a:cs typeface="Arial"/>
+                <a:sym typeface="Arial"/>
               </a:rPr>
               <a:t>(5 Points) </a:t>
             </a:r>
             <a:r>
-              <a:rPr b="0" i="0" lang="en-US" sz="1800" u="none" cap="none" strike="noStrike">
+              <a:rPr lang="en-US" sz="1800">
                 <a:solidFill>
                   <a:srgbClr val="24292E"/>
                 </a:solidFill>
                 <a:highlight>
                   <a:srgbClr val="FFFFFF"/>
                 </a:highlight>
-                <a:latin typeface="Times New Roman"/>
-                <a:ea typeface="Times New Roman"/>
-                <a:cs typeface="Times New Roman"/>
-                <a:sym typeface="Times New Roman"/>
+                <a:latin typeface="Arial"/>
+                <a:ea typeface="Arial"/>
+                <a:cs typeface="Arial"/>
+                <a:sym typeface="Arial"/>
               </a:rPr>
-              <a:t>As an HTML Developer, I need to organize the website so that I can provide a better user experience.</a:t>
+              <a:t>As a developer, I need to sort by nearby attractions so that the users can see nearby attractions.</a:t>
             </a:r>
-            <a:endParaRPr b="0" i="0" sz="1800" u="none" cap="none" strike="noStrike">
-              <a:solidFill>
-                <a:srgbClr val="24292E"/>
-              </a:solidFill>
-              <a:highlight>
-                <a:srgbClr val="FFFFFF"/>
-              </a:highlight>
-              <a:latin typeface="Times New Roman"/>
-              <a:ea typeface="Times New Roman"/>
-              <a:cs typeface="Times New Roman"/>
-              <a:sym typeface="Times New Roman"/>
+            <a:endParaRPr sz="1800">
+              <a:latin typeface="Arial"/>
+              <a:ea typeface="Arial"/>
+              <a:cs typeface="Arial"/>
+              <a:sym typeface="Arial"/>
             </a:endParaRPr>
           </a:p>
           <a:p>
-            <a:pPr indent="-342900" lvl="0" marL="457200" marR="0" rtl="0" algn="l">
+            <a:pPr indent="-342900" lvl="0" marL="457200" rtl="0">
               <a:lnSpc>
                 <a:spcPct val="115000"/>
               </a:lnSpc>
@@ -23533,39 +23495,33 @@
                 <a:srgbClr val="24292E"/>
               </a:buClr>
               <a:buSzPts val="1800"/>
-              <a:buFont typeface="Times New Roman"/>
+              <a:buFont typeface="Arial"/>
               <a:buChar char="•"/>
             </a:pPr>
             <a:r>
-              <a:rPr b="0" i="0" lang="en-US" sz="1800" u="none" cap="none" strike="noStrike">
+              <a:rPr lang="en-US" sz="1800">
                 <a:solidFill>
                   <a:srgbClr val="24292E"/>
                 </a:solidFill>
                 <a:highlight>
                   <a:srgbClr val="FFFFFF"/>
                 </a:highlight>
-                <a:latin typeface="Times New Roman"/>
-                <a:ea typeface="Times New Roman"/>
-                <a:cs typeface="Times New Roman"/>
-                <a:sym typeface="Times New Roman"/>
+                <a:latin typeface="Arial"/>
+                <a:ea typeface="Arial"/>
+                <a:cs typeface="Arial"/>
+                <a:sym typeface="Arial"/>
               </a:rPr>
-              <a:t>(5 Points) As a CSS Developer, I need to beautify the website so that I can provide a better user experience.</a:t>
+              <a:t>(1 Point) As a Developer, I need to create an About page so that I can publicize the team.</a:t>
             </a:r>
-            <a:endParaRPr b="0" i="0" sz="1800" u="none" cap="none" strike="noStrike">
-              <a:solidFill>
-                <a:srgbClr val="24292E"/>
-              </a:solidFill>
-              <a:highlight>
-                <a:srgbClr val="FFFFFF"/>
-              </a:highlight>
-              <a:latin typeface="Times New Roman"/>
-              <a:ea typeface="Times New Roman"/>
-              <a:cs typeface="Times New Roman"/>
-              <a:sym typeface="Times New Roman"/>
+            <a:endParaRPr sz="1800">
+              <a:latin typeface="Arial"/>
+              <a:ea typeface="Arial"/>
+              <a:cs typeface="Arial"/>
+              <a:sym typeface="Arial"/>
             </a:endParaRPr>
           </a:p>
           <a:p>
-            <a:pPr indent="-342900" lvl="0" marL="457200" marR="0" rtl="0" algn="l">
+            <a:pPr indent="0" lvl="0" marL="0" marR="0" rtl="0" algn="l">
               <a:lnSpc>
                 <a:spcPct val="115000"/>
               </a:lnSpc>
@@ -23575,44 +23531,12 @@
               <a:spcAft>
                 <a:spcPts val="0"/>
               </a:spcAft>
-              <a:buClr>
-                <a:schemeClr val="dk1"/>
-              </a:buClr>
-              <a:buSzPts val="1800"/>
-              <a:buFont typeface="Times New Roman"/>
-              <a:buChar char="•"/>
+              <a:buNone/>
             </a:pPr>
             <a:r>
-              <a:rPr b="0" i="0" lang="en-US" sz="1800" u="none" cap="none" strike="noStrike">
-                <a:solidFill>
-                  <a:schemeClr val="dk1"/>
-                </a:solidFill>
-                <a:latin typeface="Times New Roman"/>
-                <a:ea typeface="Times New Roman"/>
-                <a:cs typeface="Times New Roman"/>
-                <a:sym typeface="Times New Roman"/>
-              </a:rPr>
-              <a:t>(3 Points) </a:t>
+              <a:t/>
             </a:r>
-            <a:r>
-              <a:rPr b="0" i="0" lang="en-US" sz="1800" u="none" cap="none" strike="noStrike">
-                <a:solidFill>
-                  <a:srgbClr val="24292E"/>
-                </a:solidFill>
-                <a:highlight>
-                  <a:srgbClr val="FFFFFF"/>
-                </a:highlight>
-                <a:latin typeface="Times New Roman"/>
-                <a:ea typeface="Times New Roman"/>
-                <a:cs typeface="Times New Roman"/>
-                <a:sym typeface="Times New Roman"/>
-              </a:rPr>
-              <a:t>As a User, I want to have a visual representation if I am heading the right direction so that I don't get lost.</a:t>
-            </a:r>
-            <a:endParaRPr b="0" i="0" sz="1800" u="none" cap="none" strike="noStrike">
-              <a:solidFill>
-                <a:schemeClr val="dk1"/>
-              </a:solidFill>
+            <a:endParaRPr sz="1800">
               <a:latin typeface="Times New Roman"/>
               <a:ea typeface="Times New Roman"/>
               <a:cs typeface="Times New Roman"/>
@@ -24006,7 +23930,7 @@
             </a:endParaRPr>
           </a:p>
           <a:p>
-            <a:pPr indent="-342900" lvl="0" marL="457200" marR="0" rtl="0" algn="l">
+            <a:pPr indent="-342900" lvl="0" marL="457200" rtl="0">
               <a:lnSpc>
                 <a:spcPct val="115000"/>
               </a:lnSpc>
@@ -24020,31 +23944,74 @@
                 <a:srgbClr val="24292E"/>
               </a:buClr>
               <a:buSzPts val="1800"/>
-              <a:buFont typeface="Times New Roman"/>
+              <a:buFont typeface="Arial"/>
               <a:buChar char="•"/>
             </a:pPr>
             <a:r>
-              <a:rPr b="0" i="0" lang="en-US" sz="1800" u="none" cap="none" strike="noStrike">
-                <a:solidFill>
-                  <a:srgbClr val="24292E"/>
-                </a:solidFill>
-                <a:highlight>
-                  <a:srgbClr val="FFFFFF"/>
-                </a:highlight>
+              <a:rPr lang="en-US" sz="1800">
                 <a:latin typeface="Times New Roman"/>
                 <a:ea typeface="Times New Roman"/>
                 <a:cs typeface="Times New Roman"/>
                 <a:sym typeface="Times New Roman"/>
               </a:rPr>
-              <a:t>(13 Points) As a User, I want to create my own path so that I can enhance SlugPath more efficiently.</a:t>
+              <a:t>(8 Points) As a UX Designer, I need to beautify the website so that users will be attracted to the site and so that the layout is not confusing.</a:t>
             </a:r>
-            <a:endParaRPr b="0" i="0" sz="1800" u="none" cap="none" strike="noStrike">
+            <a:endParaRPr sz="1800">
               <a:solidFill>
                 <a:srgbClr val="24292E"/>
               </a:solidFill>
               <a:highlight>
                 <a:srgbClr val="FFFFFF"/>
               </a:highlight>
+              <a:latin typeface="Arial"/>
+              <a:ea typeface="Arial"/>
+              <a:cs typeface="Arial"/>
+              <a:sym typeface="Arial"/>
+            </a:endParaRPr>
+          </a:p>
+          <a:p>
+            <a:pPr indent="-342900" lvl="0" marL="457200" rtl="0">
+              <a:lnSpc>
+                <a:spcPct val="115000"/>
+              </a:lnSpc>
+              <a:spcBef>
+                <a:spcPts val="0"/>
+              </a:spcBef>
+              <a:spcAft>
+                <a:spcPts val="0"/>
+              </a:spcAft>
+              <a:buClr>
+                <a:srgbClr val="24292E"/>
+              </a:buClr>
+              <a:buSzPts val="1800"/>
+              <a:buFont typeface="Arial"/>
+              <a:buChar char="•"/>
+            </a:pPr>
+            <a:r>
+              <a:rPr lang="en-US" sz="1800">
+                <a:solidFill>
+                  <a:srgbClr val="24292E"/>
+                </a:solidFill>
+                <a:highlight>
+                  <a:srgbClr val="FFFFFF"/>
+                </a:highlight>
+                <a:latin typeface="Arial"/>
+                <a:ea typeface="Arial"/>
+                <a:cs typeface="Arial"/>
+                <a:sym typeface="Arial"/>
+              </a:rPr>
+              <a:t>(5 Points) </a:t>
+            </a:r>
+            <a:r>
+              <a:rPr lang="en-US" sz="1800">
+                <a:latin typeface="Times New Roman"/>
+                <a:ea typeface="Times New Roman"/>
+                <a:cs typeface="Times New Roman"/>
+                <a:sym typeface="Times New Roman"/>
+              </a:rPr>
+              <a:t>As students, we need to prepare our presentation of our project so that we can get a good final grade.</a:t>
+            </a:r>
+            <a:endParaRPr sz="1800">
               <a:latin typeface="Times New Roman"/>
               <a:ea typeface="Times New Roman"/>
               <a:cs typeface="Times New Roman"/>
@@ -24052,7 +24019,7 @@
             </a:endParaRPr>
           </a:p>
           <a:p>
-            <a:pPr indent="-342900" lvl="0" marL="457200" marR="0" rtl="0" algn="l">
+            <a:pPr indent="-342900" lvl="0" marL="457200" rtl="0">
               <a:lnSpc>
                 <a:spcPct val="115000"/>
               </a:lnSpc>
@@ -24066,28 +24033,40 @@
                 <a:srgbClr val="24292E"/>
               </a:buClr>
               <a:buSzPts val="1800"/>
-              <a:buFont typeface="Times New Roman"/>
+              <a:buFont typeface="Arial"/>
               <a:buChar char="•"/>
             </a:pPr>
             <a:r>
-              <a:rPr b="0" i="0" lang="en-US" sz="1800" u="none" cap="none" strike="noStrike">
+              <a:rPr lang="en-US" sz="1800">
                 <a:solidFill>
                   <a:srgbClr val="24292E"/>
                 </a:solidFill>
                 <a:highlight>
                   <a:srgbClr val="FFFFFF"/>
                 </a:highlight>
+                <a:latin typeface="Arial"/>
+                <a:ea typeface="Arial"/>
+                <a:cs typeface="Arial"/>
+                <a:sym typeface="Arial"/>
+              </a:rPr>
+              <a:t>(5 Points) </a:t>
+            </a:r>
+            <a:r>
+              <a:rPr lang="en-US" sz="1800">
                 <a:latin typeface="Times New Roman"/>
                 <a:ea typeface="Times New Roman"/>
                 <a:cs typeface="Times New Roman"/>
                 <a:sym typeface="Times New Roman"/>
               </a:rPr>
-              <a:t>(1 Point) As a Developer, I need to create an About page so that I can publicize the team.</a:t>
+              <a:t>As a user, I want to have cues to know that I am going in the right direction so that I don’t get lost.</a:t>
             </a:r>
-            <a:endParaRPr b="0" i="0" sz="1800" u="none" cap="none" strike="noStrike">
+            <a:endParaRPr sz="1800">
               <a:solidFill>
-                <a:schemeClr val="dk1"/>
+                <a:srgbClr val="24292E"/>
               </a:solidFill>
+              <a:highlight>
+                <a:srgbClr val="FFFFFF"/>
+              </a:highlight>
               <a:latin typeface="Times New Roman"/>
               <a:ea typeface="Times New Roman"/>
               <a:cs typeface="Times New Roman"/>
@@ -24391,17 +24370,18 @@
           <p:cNvPicPr preferRelativeResize="0"/>
           <p:nvPr/>
         </p:nvPicPr>
-        <p:blipFill rotWithShape="1">
+        <p:blipFill>
           <a:blip r:embed="rId4">
             <a:alphaModFix/>
           </a:blip>
-          <a:srcRect b="19138" l="23303" r="23626" t="15381"/>
-          <a:stretch/>
+          <a:stretch>
+            <a:fillRect/>
+          </a:stretch>
         </p:blipFill>
         <p:spPr>
           <a:xfrm>
-            <a:off x="1169325" y="846938"/>
-            <a:ext cx="5575029" cy="5315186"/>
+            <a:off x="1316950" y="1049213"/>
+            <a:ext cx="6610348" cy="5121531"/>
           </a:xfrm>
           <a:prstGeom prst="rect">
             <a:avLst/>
@@ -24692,7 +24672,16 @@
                 <a:cs typeface="Times New Roman"/>
                 <a:sym typeface="Times New Roman"/>
               </a:rPr>
-              <a:t>Creating a dynamic algorithm so that we won’t have to run shortest path algorithm such as Dijkstra's algorithm for each user query</a:t>
+              <a:t>Creating a dynamic algorithm so that </a:t>
+            </a:r>
+            <a:r>
+              <a:rPr lang="en-US" sz="3000">
+                <a:latin typeface="Times New Roman"/>
+                <a:ea typeface="Times New Roman"/>
+                <a:cs typeface="Times New Roman"/>
+                <a:sym typeface="Times New Roman"/>
+              </a:rPr>
+              <a:t>each user query will not take more than half of a second to load.</a:t>
             </a:r>
             <a:endParaRPr b="0" i="0" sz="3000" u="none" cap="none" strike="noStrike">
               <a:solidFill>

</xml_diff>

<commit_message>
fix merge conflict messages
</commit_message>
<xml_diff>
--- a/Documentation/Release Plan Presentation.pptx
+++ b/Documentation/Release Plan Presentation.pptx
@@ -22900,7 +22900,7 @@
                 <a:cs typeface="Arial"/>
                 <a:sym typeface="Arial"/>
               </a:rPr>
-              <a:t>21 Points) </a:t>
+              <a:t>(21 Points) </a:t>
             </a:r>
             <a:r>
               <a:rPr lang="en-US" sz="1800">
@@ -23401,34 +23401,71 @@
             </a:endParaRPr>
           </a:p>
           <a:p>
-            <a:pPr indent="0" lvl="0" marL="0" marR="0" rtl="0" algn="l">
-              <a:lnSpc>
-                <a:spcPct val="100000"/>
-              </a:lnSpc>
-              <a:spcBef>
-                <a:spcPts val="0"/>
-              </a:spcBef>
-              <a:spcAft>
-                <a:spcPts val="0"/>
-              </a:spcAft>
-              <a:buClr>
-                <a:schemeClr val="dk1"/>
-              </a:buClr>
-              <a:buSzPts val="3200"/>
-              <a:buFont typeface="Arial"/>
-              <a:buNone/>
+            <a:pPr indent="-342900" lvl="0" marL="457200" rtl="0">
+              <a:lnSpc>
+                <a:spcPct val="115000"/>
+              </a:lnSpc>
+              <a:spcBef>
+                <a:spcPts val="0"/>
+              </a:spcBef>
+              <a:spcAft>
+                <a:spcPts val="0"/>
+              </a:spcAft>
+              <a:buClr>
+                <a:schemeClr val="dk1"/>
+              </a:buClr>
+              <a:buSzPts val="1800"/>
+              <a:buFont typeface="Arial"/>
+              <a:buChar char="•"/>
             </a:pPr>
             <a:r>
-              <a:t/>
+              <a:rPr lang="en-US" sz="1800">
+                <a:latin typeface="Arial"/>
+                <a:ea typeface="Arial"/>
+                <a:cs typeface="Arial"/>
+                <a:sym typeface="Arial"/>
+              </a:rPr>
+              <a:t>(21 Points) As a data manager, I want to figure out how to represent our data so that our developers can effectively use the data.</a:t>
             </a:r>
-            <a:endParaRPr b="0" i="0" sz="3200" u="none" cap="none" strike="noStrike">
-              <a:solidFill>
-                <a:schemeClr val="dk1"/>
-              </a:solidFill>
-              <a:latin typeface="Times New Roman"/>
-              <a:ea typeface="Times New Roman"/>
-              <a:cs typeface="Times New Roman"/>
-              <a:sym typeface="Times New Roman"/>
+            <a:endParaRPr sz="1800">
+              <a:latin typeface="Arial"/>
+              <a:ea typeface="Arial"/>
+              <a:cs typeface="Arial"/>
+              <a:sym typeface="Arial"/>
+            </a:endParaRPr>
+          </a:p>
+          <a:p>
+            <a:pPr indent="-342900" lvl="0" marL="457200" rtl="0">
+              <a:lnSpc>
+                <a:spcPct val="115000"/>
+              </a:lnSpc>
+              <a:spcBef>
+                <a:spcPts val="0"/>
+              </a:spcBef>
+              <a:spcAft>
+                <a:spcPts val="0"/>
+              </a:spcAft>
+              <a:buClr>
+                <a:schemeClr val="dk1"/>
+              </a:buClr>
+              <a:buSzPts val="1800"/>
+              <a:buFont typeface="Times New Roman"/>
+              <a:buChar char="•"/>
+            </a:pPr>
+            <a:r>
+              <a:rPr lang="en-US" sz="1800">
+                <a:latin typeface="Arial"/>
+                <a:ea typeface="Arial"/>
+                <a:cs typeface="Arial"/>
+                <a:sym typeface="Arial"/>
+              </a:rPr>
+              <a:t>(8 Points) As a javascript developer, I need to implement the shortest path algorithm so that we have an array of nodes as the shortest path. </a:t>
+            </a:r>
+            <a:endParaRPr sz="1800">
+              <a:latin typeface="Arial"/>
+              <a:ea typeface="Arial"/>
+              <a:cs typeface="Arial"/>
+              <a:sym typeface="Arial"/>
             </a:endParaRPr>
           </a:p>
           <a:p>

</xml_diff>